<commit_message>
texto sobre a area ativa do sensor
</commit_message>
<xml_diff>
--- a/manuscript/Figs/Aspectos_geometricos.pptx
+++ b/manuscript/Figs/Aspectos_geometricos.pptx
@@ -5,7 +5,7 @@
     <p:sldMasterId id="2147483648" r:id="rId1"/>
   </p:sldMasterIdLst>
   <p:notesMasterIdLst>
-    <p:notesMasterId r:id="rId13"/>
+    <p:notesMasterId r:id="rId14"/>
   </p:notesMasterIdLst>
   <p:sldIdLst>
     <p:sldId id="270" r:id="rId2"/>
@@ -19,6 +19,7 @@
     <p:sldId id="277" r:id="rId10"/>
     <p:sldId id="278" r:id="rId11"/>
     <p:sldId id="279" r:id="rId12"/>
+    <p:sldId id="280" r:id="rId13"/>
   </p:sldIdLst>
   <p:sldSz cx="9144000" cy="6858000" type="screen4x3"/>
   <p:notesSz cx="6858000" cy="9144000"/>
@@ -202,7 +203,7 @@
           <a:p>
             <a:fld id="{A72D0A6C-9BA5-4E32-9F58-11F27415CF1A}" type="datetimeFigureOut">
               <a:rPr lang="pt-BR" smtClean="0"/>
-              <a:t>22/01/2016</a:t>
+              <a:t>14/06/2016</a:t>
             </a:fld>
             <a:endParaRPr lang="pt-BR"/>
           </a:p>
@@ -1194,6 +1195,95 @@
 </p:notes>
 </file>
 
+<file path=ppt/notesSlides/notesSlide7.xml><?xml version="1.0" encoding="utf-8"?>
+<p:notes xmlns:a="http://schemas.openxmlformats.org/drawingml/2006/main" xmlns:r="http://schemas.openxmlformats.org/officeDocument/2006/relationships" xmlns:p="http://schemas.openxmlformats.org/presentationml/2006/main">
+  <p:cSld>
+    <p:spTree>
+      <p:nvGrpSpPr>
+        <p:cNvPr id="1" name=""/>
+        <p:cNvGrpSpPr/>
+        <p:nvPr/>
+      </p:nvGrpSpPr>
+      <p:grpSpPr>
+        <a:xfrm>
+          <a:off x="0" y="0"/>
+          <a:ext cx="0" cy="0"/>
+          <a:chOff x="0" y="0"/>
+          <a:chExt cx="0" cy="0"/>
+        </a:xfrm>
+      </p:grpSpPr>
+      <p:sp>
+        <p:nvSpPr>
+          <p:cNvPr id="2" name="Espaço Reservado para Imagem de Slide 1"/>
+          <p:cNvSpPr>
+            <a:spLocks noGrp="1" noRot="1" noChangeAspect="1"/>
+          </p:cNvSpPr>
+          <p:nvPr>
+            <p:ph type="sldImg"/>
+          </p:nvPr>
+        </p:nvSpPr>
+        <p:spPr>
+          <a:xfrm>
+            <a:off x="1143000" y="685800"/>
+            <a:ext cx="4572000" cy="3429000"/>
+          </a:xfrm>
+        </p:spPr>
+      </p:sp>
+      <p:sp>
+        <p:nvSpPr>
+          <p:cNvPr id="3" name="Espaço Reservado para Anotações 2"/>
+          <p:cNvSpPr>
+            <a:spLocks noGrp="1"/>
+          </p:cNvSpPr>
+          <p:nvPr>
+            <p:ph type="body" idx="1"/>
+          </p:nvPr>
+        </p:nvSpPr>
+        <p:spPr/>
+        <p:txBody>
+          <a:bodyPr/>
+          <a:lstStyle/>
+          <a:p>
+            <a:endParaRPr lang="pt-BR" dirty="0"/>
+          </a:p>
+        </p:txBody>
+      </p:sp>
+      <p:sp>
+        <p:nvSpPr>
+          <p:cNvPr id="4" name="Espaço Reservado para Número de Slide 3"/>
+          <p:cNvSpPr>
+            <a:spLocks noGrp="1"/>
+          </p:cNvSpPr>
+          <p:nvPr>
+            <p:ph type="sldNum" sz="quarter" idx="10"/>
+          </p:nvPr>
+        </p:nvSpPr>
+        <p:spPr/>
+        <p:txBody>
+          <a:bodyPr/>
+          <a:lstStyle/>
+          <a:p>
+            <a:fld id="{F1956774-3A75-48F1-BD56-D22B69D051FF}" type="slidenum">
+              <a:rPr lang="pt-BR" smtClean="0"/>
+              <a:t>12</a:t>
+            </a:fld>
+            <a:endParaRPr lang="pt-BR"/>
+          </a:p>
+        </p:txBody>
+      </p:sp>
+    </p:spTree>
+    <p:extLst>
+      <p:ext uri="{BB962C8B-B14F-4D97-AF65-F5344CB8AC3E}">
+        <p14:creationId xmlns:p14="http://schemas.microsoft.com/office/powerpoint/2010/main" val="2195727596"/>
+      </p:ext>
+    </p:extLst>
+  </p:cSld>
+  <p:clrMapOvr>
+    <a:masterClrMapping/>
+  </p:clrMapOvr>
+</p:notes>
+</file>
+
 <file path=ppt/slideLayouts/slideLayout1.xml><?xml version="1.0" encoding="utf-8"?>
 <p:sldLayout xmlns:a="http://schemas.openxmlformats.org/drawingml/2006/main" xmlns:r="http://schemas.openxmlformats.org/officeDocument/2006/relationships" xmlns:p="http://schemas.openxmlformats.org/presentationml/2006/main" type="title" preserve="1">
   <p:cSld name="Slide de título">
@@ -1375,7 +1465,7 @@
           <a:p>
             <a:fld id="{59E0689A-8B4C-40D5-AF15-5E1194025FEE}" type="datetimeFigureOut">
               <a:rPr lang="pt-BR" smtClean="0"/>
-              <a:t>22/01/2016</a:t>
+              <a:t>14/06/2016</a:t>
             </a:fld>
             <a:endParaRPr lang="pt-BR"/>
           </a:p>
@@ -1545,7 +1635,7 @@
           <a:p>
             <a:fld id="{59E0689A-8B4C-40D5-AF15-5E1194025FEE}" type="datetimeFigureOut">
               <a:rPr lang="pt-BR" smtClean="0"/>
-              <a:t>22/01/2016</a:t>
+              <a:t>14/06/2016</a:t>
             </a:fld>
             <a:endParaRPr lang="pt-BR"/>
           </a:p>
@@ -1725,7 +1815,7 @@
           <a:p>
             <a:fld id="{59E0689A-8B4C-40D5-AF15-5E1194025FEE}" type="datetimeFigureOut">
               <a:rPr lang="pt-BR" smtClean="0"/>
-              <a:t>22/01/2016</a:t>
+              <a:t>14/06/2016</a:t>
             </a:fld>
             <a:endParaRPr lang="pt-BR"/>
           </a:p>
@@ -1895,7 +1985,7 @@
           <a:p>
             <a:fld id="{59E0689A-8B4C-40D5-AF15-5E1194025FEE}" type="datetimeFigureOut">
               <a:rPr lang="pt-BR" smtClean="0"/>
-              <a:t>22/01/2016</a:t>
+              <a:t>14/06/2016</a:t>
             </a:fld>
             <a:endParaRPr lang="pt-BR"/>
           </a:p>
@@ -2141,7 +2231,7 @@
           <a:p>
             <a:fld id="{59E0689A-8B4C-40D5-AF15-5E1194025FEE}" type="datetimeFigureOut">
               <a:rPr lang="pt-BR" smtClean="0"/>
-              <a:t>22/01/2016</a:t>
+              <a:t>14/06/2016</a:t>
             </a:fld>
             <a:endParaRPr lang="pt-BR"/>
           </a:p>
@@ -2429,7 +2519,7 @@
           <a:p>
             <a:fld id="{59E0689A-8B4C-40D5-AF15-5E1194025FEE}" type="datetimeFigureOut">
               <a:rPr lang="pt-BR" smtClean="0"/>
-              <a:t>22/01/2016</a:t>
+              <a:t>14/06/2016</a:t>
             </a:fld>
             <a:endParaRPr lang="pt-BR"/>
           </a:p>
@@ -2851,7 +2941,7 @@
           <a:p>
             <a:fld id="{59E0689A-8B4C-40D5-AF15-5E1194025FEE}" type="datetimeFigureOut">
               <a:rPr lang="pt-BR" smtClean="0"/>
-              <a:t>22/01/2016</a:t>
+              <a:t>14/06/2016</a:t>
             </a:fld>
             <a:endParaRPr lang="pt-BR"/>
           </a:p>
@@ -2969,7 +3059,7 @@
           <a:p>
             <a:fld id="{59E0689A-8B4C-40D5-AF15-5E1194025FEE}" type="datetimeFigureOut">
               <a:rPr lang="pt-BR" smtClean="0"/>
-              <a:t>22/01/2016</a:t>
+              <a:t>14/06/2016</a:t>
             </a:fld>
             <a:endParaRPr lang="pt-BR"/>
           </a:p>
@@ -3064,7 +3154,7 @@
           <a:p>
             <a:fld id="{59E0689A-8B4C-40D5-AF15-5E1194025FEE}" type="datetimeFigureOut">
               <a:rPr lang="pt-BR" smtClean="0"/>
-              <a:t>22/01/2016</a:t>
+              <a:t>14/06/2016</a:t>
             </a:fld>
             <a:endParaRPr lang="pt-BR"/>
           </a:p>
@@ -3341,7 +3431,7 @@
           <a:p>
             <a:fld id="{59E0689A-8B4C-40D5-AF15-5E1194025FEE}" type="datetimeFigureOut">
               <a:rPr lang="pt-BR" smtClean="0"/>
-              <a:t>22/01/2016</a:t>
+              <a:t>14/06/2016</a:t>
             </a:fld>
             <a:endParaRPr lang="pt-BR"/>
           </a:p>
@@ -3594,7 +3684,7 @@
           <a:p>
             <a:fld id="{59E0689A-8B4C-40D5-AF15-5E1194025FEE}" type="datetimeFigureOut">
               <a:rPr lang="pt-BR" smtClean="0"/>
-              <a:t>22/01/2016</a:t>
+              <a:t>14/06/2016</a:t>
             </a:fld>
             <a:endParaRPr lang="pt-BR"/>
           </a:p>
@@ -3807,7 +3897,7 @@
           <a:p>
             <a:fld id="{59E0689A-8B4C-40D5-AF15-5E1194025FEE}" type="datetimeFigureOut">
               <a:rPr lang="pt-BR" smtClean="0"/>
-              <a:t>22/01/2016</a:t>
+              <a:t>14/06/2016</a:t>
             </a:fld>
             <a:endParaRPr lang="pt-BR"/>
           </a:p>
@@ -7943,6 +8033,1230 @@
     <p:extLst>
       <p:ext uri="{BB962C8B-B14F-4D97-AF65-F5344CB8AC3E}">
         <p14:creationId xmlns:p14="http://schemas.microsoft.com/office/powerpoint/2010/main" val="879827015"/>
+      </p:ext>
+    </p:extLst>
+  </p:cSld>
+  <p:clrMapOvr>
+    <a:masterClrMapping/>
+  </p:clrMapOvr>
+  <p:timing>
+    <p:tnLst>
+      <p:par>
+        <p:cTn id="1" dur="indefinite" restart="never" nodeType="tmRoot"/>
+      </p:par>
+    </p:tnLst>
+  </p:timing>
+</p:sld>
+</file>
+
+<file path=ppt/slides/slide12.xml><?xml version="1.0" encoding="utf-8"?>
+<p:sld xmlns:a="http://schemas.openxmlformats.org/drawingml/2006/main" xmlns:r="http://schemas.openxmlformats.org/officeDocument/2006/relationships" xmlns:p="http://schemas.openxmlformats.org/presentationml/2006/main">
+  <p:cSld>
+    <p:spTree>
+      <p:nvGrpSpPr>
+        <p:cNvPr id="1" name=""/>
+        <p:cNvGrpSpPr/>
+        <p:nvPr/>
+      </p:nvGrpSpPr>
+      <p:grpSpPr>
+        <a:xfrm>
+          <a:off x="0" y="0"/>
+          <a:ext cx="0" cy="0"/>
+          <a:chOff x="0" y="0"/>
+          <a:chExt cx="0" cy="0"/>
+        </a:xfrm>
+      </p:grpSpPr>
+      <p:sp>
+        <p:nvSpPr>
+          <p:cNvPr id="62" name="CaixaDeTexto 61"/>
+          <p:cNvSpPr txBox="1"/>
+          <p:nvPr/>
+        </p:nvSpPr>
+        <p:spPr>
+          <a:xfrm>
+            <a:off x="1727344" y="4994012"/>
+            <a:ext cx="625492" cy="523220"/>
+          </a:xfrm>
+          <a:prstGeom prst="rect">
+            <a:avLst/>
+          </a:prstGeom>
+          <a:noFill/>
+        </p:spPr>
+        <p:txBody>
+          <a:bodyPr wrap="none" rtlCol="0">
+            <a:spAutoFit/>
+          </a:bodyPr>
+          <a:lstStyle/>
+          <a:p>
+            <a:r>
+              <a:rPr lang="pt-BR" sz="2800" dirty="0" smtClean="0">
+                <a:latin typeface="Arial" panose="020B0604020202020204" pitchFamily="34" charset="0"/>
+                <a:cs typeface="Arial" panose="020B0604020202020204" pitchFamily="34" charset="0"/>
+              </a:rPr>
+              <a:t>(a)</a:t>
+            </a:r>
+            <a:endParaRPr lang="pt-BR" sz="2800" dirty="0">
+              <a:latin typeface="Arial" panose="020B0604020202020204" pitchFamily="34" charset="0"/>
+              <a:cs typeface="Arial" panose="020B0604020202020204" pitchFamily="34" charset="0"/>
+            </a:endParaRPr>
+          </a:p>
+        </p:txBody>
+      </p:sp>
+      <p:sp>
+        <p:nvSpPr>
+          <p:cNvPr id="18" name="Cubo 17"/>
+          <p:cNvSpPr>
+            <a:spLocks noChangeAspect="1"/>
+          </p:cNvSpPr>
+          <p:nvPr/>
+        </p:nvSpPr>
+        <p:spPr>
+          <a:xfrm>
+            <a:off x="899592" y="1700808"/>
+            <a:ext cx="3060000" cy="2640712"/>
+          </a:xfrm>
+          <a:prstGeom prst="cube">
+            <a:avLst>
+              <a:gd name="adj" fmla="val 85349"/>
+            </a:avLst>
+          </a:prstGeom>
+          <a:solidFill>
+            <a:schemeClr val="bg1">
+              <a:lumMod val="50000"/>
+            </a:schemeClr>
+          </a:solidFill>
+          <a:ln>
+            <a:solidFill>
+              <a:schemeClr val="tx1"/>
+            </a:solidFill>
+          </a:ln>
+        </p:spPr>
+        <p:style>
+          <a:lnRef idx="2">
+            <a:schemeClr val="accent1">
+              <a:shade val="50000"/>
+            </a:schemeClr>
+          </a:lnRef>
+          <a:fillRef idx="1">
+            <a:schemeClr val="accent1"/>
+          </a:fillRef>
+          <a:effectRef idx="0">
+            <a:schemeClr val="accent1"/>
+          </a:effectRef>
+          <a:fontRef idx="minor">
+            <a:schemeClr val="lt1"/>
+          </a:fontRef>
+        </p:style>
+        <p:txBody>
+          <a:bodyPr rtlCol="0" anchor="ctr"/>
+          <a:lstStyle/>
+          <a:p>
+            <a:pPr algn="ctr"/>
+            <a:endParaRPr lang="pt-BR"/>
+          </a:p>
+        </p:txBody>
+      </p:sp>
+      <p:cxnSp>
+        <p:nvCxnSpPr>
+          <p:cNvPr id="14" name="Conector reto 13"/>
+          <p:cNvCxnSpPr/>
+          <p:nvPr/>
+        </p:nvCxnSpPr>
+        <p:spPr>
+          <a:xfrm>
+            <a:off x="2072698" y="1957124"/>
+            <a:ext cx="0" cy="1224000"/>
+          </a:xfrm>
+          <a:prstGeom prst="line">
+            <a:avLst/>
+          </a:prstGeom>
+          <a:ln w="19050">
+            <a:solidFill>
+              <a:schemeClr val="tx1"/>
+            </a:solidFill>
+            <a:prstDash val="sysDash"/>
+            <a:headEnd type="arrow" w="med" len="med"/>
+            <a:tailEnd type="arrow" w="med" len="med"/>
+          </a:ln>
+        </p:spPr>
+        <p:style>
+          <a:lnRef idx="1">
+            <a:schemeClr val="accent1"/>
+          </a:lnRef>
+          <a:fillRef idx="0">
+            <a:schemeClr val="accent1"/>
+          </a:fillRef>
+          <a:effectRef idx="0">
+            <a:schemeClr val="accent1"/>
+          </a:effectRef>
+          <a:fontRef idx="minor">
+            <a:schemeClr val="tx1"/>
+          </a:fontRef>
+        </p:style>
+      </p:cxnSp>
+      <p:sp>
+        <p:nvSpPr>
+          <p:cNvPr id="15" name="CaixaDeTexto 14"/>
+          <p:cNvSpPr txBox="1"/>
+          <p:nvPr/>
+        </p:nvSpPr>
+        <p:spPr>
+          <a:xfrm>
+            <a:off x="1661870" y="2268161"/>
+            <a:ext cx="389850" cy="584775"/>
+          </a:xfrm>
+          <a:prstGeom prst="rect">
+            <a:avLst/>
+          </a:prstGeom>
+          <a:noFill/>
+        </p:spPr>
+        <p:txBody>
+          <a:bodyPr wrap="none" rtlCol="0">
+            <a:spAutoFit/>
+          </a:bodyPr>
+          <a:lstStyle/>
+          <a:p>
+            <a:r>
+              <a:rPr lang="pt-BR" sz="3200" i="1" dirty="0" smtClean="0">
+                <a:latin typeface="Times New Roman" panose="02020603050405020304" pitchFamily="18" charset="0"/>
+                <a:cs typeface="Times New Roman" panose="02020603050405020304" pitchFamily="18" charset="0"/>
+              </a:rPr>
+              <a:t>h</a:t>
+            </a:r>
+            <a:endParaRPr lang="pt-BR" sz="3200" i="1" dirty="0">
+              <a:latin typeface="Times New Roman" panose="02020603050405020304" pitchFamily="18" charset="0"/>
+              <a:cs typeface="Times New Roman" panose="02020603050405020304" pitchFamily="18" charset="0"/>
+            </a:endParaRPr>
+          </a:p>
+        </p:txBody>
+      </p:sp>
+      <p:sp>
+        <p:nvSpPr>
+          <p:cNvPr id="12" name="Forma livre 11"/>
+          <p:cNvSpPr/>
+          <p:nvPr/>
+        </p:nvSpPr>
+        <p:spPr>
+          <a:xfrm>
+            <a:off x="1700975" y="1840727"/>
+            <a:ext cx="743447" cy="290223"/>
+          </a:xfrm>
+          <a:custGeom>
+            <a:avLst/>
+            <a:gdLst>
+              <a:gd name="connsiteX0" fmla="*/ 0 w 743447"/>
+              <a:gd name="connsiteY0" fmla="*/ 290223 h 290223"/>
+              <a:gd name="connsiteX1" fmla="*/ 286247 w 743447"/>
+              <a:gd name="connsiteY1" fmla="*/ 0 h 290223"/>
+              <a:gd name="connsiteX2" fmla="*/ 743447 w 743447"/>
+              <a:gd name="connsiteY2" fmla="*/ 3976 h 290223"/>
+              <a:gd name="connsiteX3" fmla="*/ 449249 w 743447"/>
+              <a:gd name="connsiteY3" fmla="*/ 290223 h 290223"/>
+              <a:gd name="connsiteX4" fmla="*/ 0 w 743447"/>
+              <a:gd name="connsiteY4" fmla="*/ 290223 h 290223"/>
+            </a:gdLst>
+            <a:ahLst/>
+            <a:cxnLst>
+              <a:cxn ang="0">
+                <a:pos x="connsiteX0" y="connsiteY0"/>
+              </a:cxn>
+              <a:cxn ang="0">
+                <a:pos x="connsiteX1" y="connsiteY1"/>
+              </a:cxn>
+              <a:cxn ang="0">
+                <a:pos x="connsiteX2" y="connsiteY2"/>
+              </a:cxn>
+              <a:cxn ang="0">
+                <a:pos x="connsiteX3" y="connsiteY3"/>
+              </a:cxn>
+              <a:cxn ang="0">
+                <a:pos x="connsiteX4" y="connsiteY4"/>
+              </a:cxn>
+            </a:cxnLst>
+            <a:rect l="l" t="t" r="r" b="b"/>
+            <a:pathLst>
+              <a:path w="743447" h="290223">
+                <a:moveTo>
+                  <a:pt x="0" y="290223"/>
+                </a:moveTo>
+                <a:lnTo>
+                  <a:pt x="286247" y="0"/>
+                </a:lnTo>
+                <a:lnTo>
+                  <a:pt x="743447" y="3976"/>
+                </a:lnTo>
+                <a:lnTo>
+                  <a:pt x="449249" y="290223"/>
+                </a:lnTo>
+                <a:lnTo>
+                  <a:pt x="0" y="290223"/>
+                </a:lnTo>
+                <a:close/>
+              </a:path>
+            </a:pathLst>
+          </a:custGeom>
+          <a:solidFill>
+            <a:schemeClr val="bg1">
+              <a:lumMod val="95000"/>
+              <a:alpha val="70000"/>
+            </a:schemeClr>
+          </a:solidFill>
+          <a:ln>
+            <a:noFill/>
+          </a:ln>
+        </p:spPr>
+        <p:style>
+          <a:lnRef idx="2">
+            <a:schemeClr val="accent1">
+              <a:shade val="50000"/>
+            </a:schemeClr>
+          </a:lnRef>
+          <a:fillRef idx="1">
+            <a:schemeClr val="accent1"/>
+          </a:fillRef>
+          <a:effectRef idx="0">
+            <a:schemeClr val="accent1"/>
+          </a:effectRef>
+          <a:fontRef idx="minor">
+            <a:schemeClr val="lt1"/>
+          </a:fontRef>
+        </p:style>
+        <p:txBody>
+          <a:bodyPr rtlCol="0" anchor="ctr"/>
+          <a:lstStyle/>
+          <a:p>
+            <a:pPr algn="ctr"/>
+            <a:endParaRPr lang="pt-BR"/>
+          </a:p>
+        </p:txBody>
+      </p:sp>
+      <p:cxnSp>
+        <p:nvCxnSpPr>
+          <p:cNvPr id="76" name="Conector reto 75"/>
+          <p:cNvCxnSpPr/>
+          <p:nvPr/>
+        </p:nvCxnSpPr>
+        <p:spPr>
+          <a:xfrm rot="16200000">
+            <a:off x="1917480" y="1898857"/>
+            <a:ext cx="0" cy="468000"/>
+          </a:xfrm>
+          <a:prstGeom prst="line">
+            <a:avLst/>
+          </a:prstGeom>
+          <a:ln w="19050">
+            <a:solidFill>
+              <a:schemeClr val="tx1"/>
+            </a:solidFill>
+          </a:ln>
+        </p:spPr>
+        <p:style>
+          <a:lnRef idx="1">
+            <a:schemeClr val="accent1"/>
+          </a:lnRef>
+          <a:fillRef idx="0">
+            <a:schemeClr val="accent1"/>
+          </a:fillRef>
+          <a:effectRef idx="0">
+            <a:schemeClr val="accent1"/>
+          </a:effectRef>
+          <a:fontRef idx="minor">
+            <a:schemeClr val="tx1"/>
+          </a:fontRef>
+        </p:style>
+      </p:cxnSp>
+      <p:cxnSp>
+        <p:nvCxnSpPr>
+          <p:cNvPr id="46" name="Conector reto 45"/>
+          <p:cNvCxnSpPr/>
+          <p:nvPr/>
+        </p:nvCxnSpPr>
+        <p:spPr>
+          <a:xfrm rot="16200000">
+            <a:off x="2209488" y="1602873"/>
+            <a:ext cx="0" cy="468000"/>
+          </a:xfrm>
+          <a:prstGeom prst="line">
+            <a:avLst/>
+          </a:prstGeom>
+          <a:ln w="19050">
+            <a:solidFill>
+              <a:schemeClr val="tx1"/>
+            </a:solidFill>
+          </a:ln>
+        </p:spPr>
+        <p:style>
+          <a:lnRef idx="1">
+            <a:schemeClr val="accent1"/>
+          </a:lnRef>
+          <a:fillRef idx="0">
+            <a:schemeClr val="accent1"/>
+          </a:fillRef>
+          <a:effectRef idx="0">
+            <a:schemeClr val="accent1"/>
+          </a:effectRef>
+          <a:fontRef idx="minor">
+            <a:schemeClr val="tx1"/>
+          </a:fontRef>
+        </p:style>
+      </p:cxnSp>
+      <p:cxnSp>
+        <p:nvCxnSpPr>
+          <p:cNvPr id="9" name="Conector reto 8"/>
+          <p:cNvCxnSpPr/>
+          <p:nvPr/>
+        </p:nvCxnSpPr>
+        <p:spPr>
+          <a:xfrm flipV="1">
+            <a:off x="1691432" y="1840872"/>
+            <a:ext cx="288032" cy="288008"/>
+          </a:xfrm>
+          <a:prstGeom prst="line">
+            <a:avLst/>
+          </a:prstGeom>
+          <a:ln w="19050">
+            <a:solidFill>
+              <a:schemeClr val="tx1"/>
+            </a:solidFill>
+          </a:ln>
+        </p:spPr>
+        <p:style>
+          <a:lnRef idx="1">
+            <a:schemeClr val="accent1"/>
+          </a:lnRef>
+          <a:fillRef idx="0">
+            <a:schemeClr val="accent1"/>
+          </a:fillRef>
+          <a:effectRef idx="0">
+            <a:schemeClr val="accent1"/>
+          </a:effectRef>
+          <a:fontRef idx="minor">
+            <a:schemeClr val="tx1"/>
+          </a:fontRef>
+        </p:style>
+      </p:cxnSp>
+      <p:cxnSp>
+        <p:nvCxnSpPr>
+          <p:cNvPr id="53" name="Conector reto 52"/>
+          <p:cNvCxnSpPr/>
+          <p:nvPr/>
+        </p:nvCxnSpPr>
+        <p:spPr>
+          <a:xfrm flipV="1">
+            <a:off x="2151440" y="1840848"/>
+            <a:ext cx="288032" cy="288008"/>
+          </a:xfrm>
+          <a:prstGeom prst="line">
+            <a:avLst/>
+          </a:prstGeom>
+          <a:ln w="19050">
+            <a:solidFill>
+              <a:schemeClr val="tx1"/>
+            </a:solidFill>
+          </a:ln>
+        </p:spPr>
+        <p:style>
+          <a:lnRef idx="1">
+            <a:schemeClr val="accent1"/>
+          </a:lnRef>
+          <a:fillRef idx="0">
+            <a:schemeClr val="accent1"/>
+          </a:fillRef>
+          <a:effectRef idx="0">
+            <a:schemeClr val="accent1"/>
+          </a:effectRef>
+          <a:fontRef idx="minor">
+            <a:schemeClr val="tx1"/>
+          </a:fontRef>
+        </p:style>
+      </p:cxnSp>
+      <p:sp>
+        <p:nvSpPr>
+          <p:cNvPr id="17" name="Retângulo 16"/>
+          <p:cNvSpPr/>
+          <p:nvPr/>
+        </p:nvSpPr>
+        <p:spPr>
+          <a:xfrm>
+            <a:off x="5724408" y="764984"/>
+            <a:ext cx="2520000" cy="2520000"/>
+          </a:xfrm>
+          <a:prstGeom prst="rect">
+            <a:avLst/>
+          </a:prstGeom>
+          <a:solidFill>
+            <a:schemeClr val="bg1">
+              <a:lumMod val="95000"/>
+            </a:schemeClr>
+          </a:solidFill>
+          <a:ln w="28575">
+            <a:solidFill>
+              <a:schemeClr val="tx1"/>
+            </a:solidFill>
+          </a:ln>
+        </p:spPr>
+        <p:style>
+          <a:lnRef idx="2">
+            <a:schemeClr val="accent1">
+              <a:shade val="50000"/>
+            </a:schemeClr>
+          </a:lnRef>
+          <a:fillRef idx="1">
+            <a:schemeClr val="accent1"/>
+          </a:fillRef>
+          <a:effectRef idx="0">
+            <a:schemeClr val="accent1"/>
+          </a:effectRef>
+          <a:fontRef idx="minor">
+            <a:schemeClr val="lt1"/>
+          </a:fontRef>
+        </p:style>
+        <p:txBody>
+          <a:bodyPr rtlCol="0" anchor="ctr"/>
+          <a:lstStyle/>
+          <a:p>
+            <a:pPr algn="ctr"/>
+            <a:endParaRPr lang="pt-BR" dirty="0"/>
+          </a:p>
+        </p:txBody>
+      </p:sp>
+      <p:sp>
+        <p:nvSpPr>
+          <p:cNvPr id="66" name="CaixaDeTexto 65"/>
+          <p:cNvSpPr txBox="1"/>
+          <p:nvPr/>
+        </p:nvSpPr>
+        <p:spPr>
+          <a:xfrm>
+            <a:off x="4810604" y="620968"/>
+            <a:ext cx="625492" cy="523220"/>
+          </a:xfrm>
+          <a:prstGeom prst="rect">
+            <a:avLst/>
+          </a:prstGeom>
+          <a:noFill/>
+        </p:spPr>
+        <p:txBody>
+          <a:bodyPr wrap="none" rtlCol="0">
+            <a:spAutoFit/>
+          </a:bodyPr>
+          <a:lstStyle/>
+          <a:p>
+            <a:r>
+              <a:rPr lang="pt-BR" sz="2800" dirty="0" smtClean="0">
+                <a:latin typeface="Arial" panose="020B0604020202020204" pitchFamily="34" charset="0"/>
+                <a:cs typeface="Arial" panose="020B0604020202020204" pitchFamily="34" charset="0"/>
+              </a:rPr>
+              <a:t>(b)</a:t>
+            </a:r>
+            <a:endParaRPr lang="pt-BR" sz="2800" dirty="0">
+              <a:latin typeface="Arial" panose="020B0604020202020204" pitchFamily="34" charset="0"/>
+              <a:cs typeface="Arial" panose="020B0604020202020204" pitchFamily="34" charset="0"/>
+            </a:endParaRPr>
+          </a:p>
+        </p:txBody>
+      </p:sp>
+      <p:sp>
+        <p:nvSpPr>
+          <p:cNvPr id="21" name="Elipse 20"/>
+          <p:cNvSpPr/>
+          <p:nvPr/>
+        </p:nvSpPr>
+        <p:spPr>
+          <a:xfrm>
+            <a:off x="6912460" y="1952984"/>
+            <a:ext cx="143896" cy="144000"/>
+          </a:xfrm>
+          <a:prstGeom prst="ellipse">
+            <a:avLst/>
+          </a:prstGeom>
+          <a:solidFill>
+            <a:schemeClr val="tx1"/>
+          </a:solidFill>
+          <a:ln>
+            <a:solidFill>
+              <a:schemeClr val="tx1"/>
+            </a:solidFill>
+          </a:ln>
+        </p:spPr>
+        <p:style>
+          <a:lnRef idx="2">
+            <a:schemeClr val="accent1">
+              <a:shade val="50000"/>
+            </a:schemeClr>
+          </a:lnRef>
+          <a:fillRef idx="1">
+            <a:schemeClr val="accent1"/>
+          </a:fillRef>
+          <a:effectRef idx="0">
+            <a:schemeClr val="accent1"/>
+          </a:effectRef>
+          <a:fontRef idx="minor">
+            <a:schemeClr val="lt1"/>
+          </a:fontRef>
+        </p:style>
+        <p:txBody>
+          <a:bodyPr rtlCol="0" anchor="ctr"/>
+          <a:lstStyle/>
+          <a:p>
+            <a:pPr algn="ctr"/>
+            <a:endParaRPr lang="pt-BR">
+              <a:ln>
+                <a:solidFill>
+                  <a:sysClr val="windowText" lastClr="000000"/>
+                </a:solidFill>
+              </a:ln>
+              <a:solidFill>
+                <a:sysClr val="windowText" lastClr="000000"/>
+              </a:solidFill>
+            </a:endParaRPr>
+          </a:p>
+        </p:txBody>
+      </p:sp>
+      <p:grpSp>
+        <p:nvGrpSpPr>
+          <p:cNvPr id="26" name="Grupo 25"/>
+          <p:cNvGrpSpPr/>
+          <p:nvPr/>
+        </p:nvGrpSpPr>
+        <p:grpSpPr>
+          <a:xfrm>
+            <a:off x="5724428" y="1124864"/>
+            <a:ext cx="2519960" cy="1800240"/>
+            <a:chOff x="5488788" y="2348840"/>
+            <a:chExt cx="2519960" cy="1800240"/>
+          </a:xfrm>
+        </p:grpSpPr>
+        <p:cxnSp>
+          <p:nvCxnSpPr>
+            <p:cNvPr id="25" name="Conector reto 24"/>
+            <p:cNvCxnSpPr/>
+            <p:nvPr/>
+          </p:nvCxnSpPr>
+          <p:spPr>
+            <a:xfrm>
+              <a:off x="5488788" y="2348840"/>
+              <a:ext cx="2519960" cy="0"/>
+            </a:xfrm>
+            <a:prstGeom prst="line">
+              <a:avLst/>
+            </a:prstGeom>
+            <a:ln w="28575">
+              <a:solidFill>
+                <a:schemeClr val="tx1"/>
+              </a:solidFill>
+              <a:prstDash val="sysDash"/>
+            </a:ln>
+          </p:spPr>
+          <p:style>
+            <a:lnRef idx="1">
+              <a:schemeClr val="accent1"/>
+            </a:lnRef>
+            <a:fillRef idx="0">
+              <a:schemeClr val="accent1"/>
+            </a:fillRef>
+            <a:effectRef idx="0">
+              <a:schemeClr val="accent1"/>
+            </a:effectRef>
+            <a:fontRef idx="minor">
+              <a:schemeClr val="tx1"/>
+            </a:fontRef>
+          </p:style>
+        </p:cxnSp>
+        <p:cxnSp>
+          <p:nvCxnSpPr>
+            <p:cNvPr id="120" name="Conector reto 119"/>
+            <p:cNvCxnSpPr/>
+            <p:nvPr/>
+          </p:nvCxnSpPr>
+          <p:spPr>
+            <a:xfrm>
+              <a:off x="5488788" y="2708920"/>
+              <a:ext cx="2519960" cy="0"/>
+            </a:xfrm>
+            <a:prstGeom prst="line">
+              <a:avLst/>
+            </a:prstGeom>
+            <a:ln w="28575">
+              <a:solidFill>
+                <a:schemeClr val="tx1"/>
+              </a:solidFill>
+              <a:prstDash val="sysDash"/>
+            </a:ln>
+          </p:spPr>
+          <p:style>
+            <a:lnRef idx="1">
+              <a:schemeClr val="accent1"/>
+            </a:lnRef>
+            <a:fillRef idx="0">
+              <a:schemeClr val="accent1"/>
+            </a:fillRef>
+            <a:effectRef idx="0">
+              <a:schemeClr val="accent1"/>
+            </a:effectRef>
+            <a:fontRef idx="minor">
+              <a:schemeClr val="tx1"/>
+            </a:fontRef>
+          </p:style>
+        </p:cxnSp>
+        <p:cxnSp>
+          <p:nvCxnSpPr>
+            <p:cNvPr id="121" name="Conector reto 120"/>
+            <p:cNvCxnSpPr/>
+            <p:nvPr/>
+          </p:nvCxnSpPr>
+          <p:spPr>
+            <a:xfrm>
+              <a:off x="5488788" y="3068960"/>
+              <a:ext cx="2519960" cy="0"/>
+            </a:xfrm>
+            <a:prstGeom prst="line">
+              <a:avLst/>
+            </a:prstGeom>
+            <a:ln w="28575">
+              <a:solidFill>
+                <a:schemeClr val="tx1"/>
+              </a:solidFill>
+              <a:prstDash val="sysDash"/>
+            </a:ln>
+          </p:spPr>
+          <p:style>
+            <a:lnRef idx="1">
+              <a:schemeClr val="accent1"/>
+            </a:lnRef>
+            <a:fillRef idx="0">
+              <a:schemeClr val="accent1"/>
+            </a:fillRef>
+            <a:effectRef idx="0">
+              <a:schemeClr val="accent1"/>
+            </a:effectRef>
+            <a:fontRef idx="minor">
+              <a:schemeClr val="tx1"/>
+            </a:fontRef>
+          </p:style>
+        </p:cxnSp>
+        <p:cxnSp>
+          <p:nvCxnSpPr>
+            <p:cNvPr id="122" name="Conector reto 121"/>
+            <p:cNvCxnSpPr/>
+            <p:nvPr/>
+          </p:nvCxnSpPr>
+          <p:spPr>
+            <a:xfrm>
+              <a:off x="5488788" y="3429000"/>
+              <a:ext cx="2519960" cy="0"/>
+            </a:xfrm>
+            <a:prstGeom prst="line">
+              <a:avLst/>
+            </a:prstGeom>
+            <a:ln w="28575">
+              <a:solidFill>
+                <a:schemeClr val="tx1"/>
+              </a:solidFill>
+              <a:prstDash val="sysDash"/>
+            </a:ln>
+          </p:spPr>
+          <p:style>
+            <a:lnRef idx="1">
+              <a:schemeClr val="accent1"/>
+            </a:lnRef>
+            <a:fillRef idx="0">
+              <a:schemeClr val="accent1"/>
+            </a:fillRef>
+            <a:effectRef idx="0">
+              <a:schemeClr val="accent1"/>
+            </a:effectRef>
+            <a:fontRef idx="minor">
+              <a:schemeClr val="tx1"/>
+            </a:fontRef>
+          </p:style>
+        </p:cxnSp>
+        <p:cxnSp>
+          <p:nvCxnSpPr>
+            <p:cNvPr id="123" name="Conector reto 122"/>
+            <p:cNvCxnSpPr/>
+            <p:nvPr/>
+          </p:nvCxnSpPr>
+          <p:spPr>
+            <a:xfrm>
+              <a:off x="5488788" y="3789040"/>
+              <a:ext cx="2519960" cy="0"/>
+            </a:xfrm>
+            <a:prstGeom prst="line">
+              <a:avLst/>
+            </a:prstGeom>
+            <a:ln w="28575">
+              <a:solidFill>
+                <a:schemeClr val="tx1"/>
+              </a:solidFill>
+              <a:prstDash val="sysDash"/>
+            </a:ln>
+          </p:spPr>
+          <p:style>
+            <a:lnRef idx="1">
+              <a:schemeClr val="accent1"/>
+            </a:lnRef>
+            <a:fillRef idx="0">
+              <a:schemeClr val="accent1"/>
+            </a:fillRef>
+            <a:effectRef idx="0">
+              <a:schemeClr val="accent1"/>
+            </a:effectRef>
+            <a:fontRef idx="minor">
+              <a:schemeClr val="tx1"/>
+            </a:fontRef>
+          </p:style>
+        </p:cxnSp>
+        <p:cxnSp>
+          <p:nvCxnSpPr>
+            <p:cNvPr id="124" name="Conector reto 123"/>
+            <p:cNvCxnSpPr/>
+            <p:nvPr/>
+          </p:nvCxnSpPr>
+          <p:spPr>
+            <a:xfrm>
+              <a:off x="5488788" y="4149080"/>
+              <a:ext cx="2519960" cy="0"/>
+            </a:xfrm>
+            <a:prstGeom prst="line">
+              <a:avLst/>
+            </a:prstGeom>
+            <a:ln w="28575">
+              <a:solidFill>
+                <a:schemeClr val="tx1"/>
+              </a:solidFill>
+              <a:prstDash val="sysDash"/>
+            </a:ln>
+          </p:spPr>
+          <p:style>
+            <a:lnRef idx="1">
+              <a:schemeClr val="accent1"/>
+            </a:lnRef>
+            <a:fillRef idx="0">
+              <a:schemeClr val="accent1"/>
+            </a:fillRef>
+            <a:effectRef idx="0">
+              <a:schemeClr val="accent1"/>
+            </a:effectRef>
+            <a:fontRef idx="minor">
+              <a:schemeClr val="tx1"/>
+            </a:fontRef>
+          </p:style>
+        </p:cxnSp>
+      </p:grpSp>
+      <p:grpSp>
+        <p:nvGrpSpPr>
+          <p:cNvPr id="125" name="Grupo 124"/>
+          <p:cNvGrpSpPr/>
+          <p:nvPr/>
+        </p:nvGrpSpPr>
+        <p:grpSpPr>
+          <a:xfrm rot="5400000">
+            <a:off x="5724428" y="1124864"/>
+            <a:ext cx="2519960" cy="1800240"/>
+            <a:chOff x="5488788" y="2348840"/>
+            <a:chExt cx="2519960" cy="1800240"/>
+          </a:xfrm>
+        </p:grpSpPr>
+        <p:cxnSp>
+          <p:nvCxnSpPr>
+            <p:cNvPr id="126" name="Conector reto 125"/>
+            <p:cNvCxnSpPr/>
+            <p:nvPr/>
+          </p:nvCxnSpPr>
+          <p:spPr>
+            <a:xfrm>
+              <a:off x="5488788" y="2348840"/>
+              <a:ext cx="2519960" cy="0"/>
+            </a:xfrm>
+            <a:prstGeom prst="line">
+              <a:avLst/>
+            </a:prstGeom>
+            <a:ln w="28575">
+              <a:solidFill>
+                <a:schemeClr val="tx1"/>
+              </a:solidFill>
+              <a:prstDash val="sysDash"/>
+            </a:ln>
+          </p:spPr>
+          <p:style>
+            <a:lnRef idx="1">
+              <a:schemeClr val="accent1"/>
+            </a:lnRef>
+            <a:fillRef idx="0">
+              <a:schemeClr val="accent1"/>
+            </a:fillRef>
+            <a:effectRef idx="0">
+              <a:schemeClr val="accent1"/>
+            </a:effectRef>
+            <a:fontRef idx="minor">
+              <a:schemeClr val="tx1"/>
+            </a:fontRef>
+          </p:style>
+        </p:cxnSp>
+        <p:cxnSp>
+          <p:nvCxnSpPr>
+            <p:cNvPr id="127" name="Conector reto 126"/>
+            <p:cNvCxnSpPr/>
+            <p:nvPr/>
+          </p:nvCxnSpPr>
+          <p:spPr>
+            <a:xfrm>
+              <a:off x="5488788" y="2708920"/>
+              <a:ext cx="2519960" cy="0"/>
+            </a:xfrm>
+            <a:prstGeom prst="line">
+              <a:avLst/>
+            </a:prstGeom>
+            <a:ln w="28575">
+              <a:solidFill>
+                <a:schemeClr val="tx1"/>
+              </a:solidFill>
+              <a:prstDash val="sysDash"/>
+            </a:ln>
+          </p:spPr>
+          <p:style>
+            <a:lnRef idx="1">
+              <a:schemeClr val="accent1"/>
+            </a:lnRef>
+            <a:fillRef idx="0">
+              <a:schemeClr val="accent1"/>
+            </a:fillRef>
+            <a:effectRef idx="0">
+              <a:schemeClr val="accent1"/>
+            </a:effectRef>
+            <a:fontRef idx="minor">
+              <a:schemeClr val="tx1"/>
+            </a:fontRef>
+          </p:style>
+        </p:cxnSp>
+        <p:cxnSp>
+          <p:nvCxnSpPr>
+            <p:cNvPr id="128" name="Conector reto 127"/>
+            <p:cNvCxnSpPr/>
+            <p:nvPr/>
+          </p:nvCxnSpPr>
+          <p:spPr>
+            <a:xfrm>
+              <a:off x="5488788" y="3068960"/>
+              <a:ext cx="2519960" cy="0"/>
+            </a:xfrm>
+            <a:prstGeom prst="line">
+              <a:avLst/>
+            </a:prstGeom>
+            <a:ln w="28575">
+              <a:solidFill>
+                <a:schemeClr val="tx1"/>
+              </a:solidFill>
+              <a:prstDash val="sysDash"/>
+            </a:ln>
+          </p:spPr>
+          <p:style>
+            <a:lnRef idx="1">
+              <a:schemeClr val="accent1"/>
+            </a:lnRef>
+            <a:fillRef idx="0">
+              <a:schemeClr val="accent1"/>
+            </a:fillRef>
+            <a:effectRef idx="0">
+              <a:schemeClr val="accent1"/>
+            </a:effectRef>
+            <a:fontRef idx="minor">
+              <a:schemeClr val="tx1"/>
+            </a:fontRef>
+          </p:style>
+        </p:cxnSp>
+        <p:cxnSp>
+          <p:nvCxnSpPr>
+            <p:cNvPr id="129" name="Conector reto 128"/>
+            <p:cNvCxnSpPr/>
+            <p:nvPr/>
+          </p:nvCxnSpPr>
+          <p:spPr>
+            <a:xfrm>
+              <a:off x="5488788" y="3429000"/>
+              <a:ext cx="2519960" cy="0"/>
+            </a:xfrm>
+            <a:prstGeom prst="line">
+              <a:avLst/>
+            </a:prstGeom>
+            <a:ln w="28575">
+              <a:solidFill>
+                <a:schemeClr val="tx1"/>
+              </a:solidFill>
+              <a:prstDash val="sysDash"/>
+            </a:ln>
+          </p:spPr>
+          <p:style>
+            <a:lnRef idx="1">
+              <a:schemeClr val="accent1"/>
+            </a:lnRef>
+            <a:fillRef idx="0">
+              <a:schemeClr val="accent1"/>
+            </a:fillRef>
+            <a:effectRef idx="0">
+              <a:schemeClr val="accent1"/>
+            </a:effectRef>
+            <a:fontRef idx="minor">
+              <a:schemeClr val="tx1"/>
+            </a:fontRef>
+          </p:style>
+        </p:cxnSp>
+        <p:cxnSp>
+          <p:nvCxnSpPr>
+            <p:cNvPr id="130" name="Conector reto 129"/>
+            <p:cNvCxnSpPr/>
+            <p:nvPr/>
+          </p:nvCxnSpPr>
+          <p:spPr>
+            <a:xfrm>
+              <a:off x="5488788" y="3789040"/>
+              <a:ext cx="2519960" cy="0"/>
+            </a:xfrm>
+            <a:prstGeom prst="line">
+              <a:avLst/>
+            </a:prstGeom>
+            <a:ln w="28575">
+              <a:solidFill>
+                <a:schemeClr val="tx1"/>
+              </a:solidFill>
+              <a:prstDash val="sysDash"/>
+            </a:ln>
+          </p:spPr>
+          <p:style>
+            <a:lnRef idx="1">
+              <a:schemeClr val="accent1"/>
+            </a:lnRef>
+            <a:fillRef idx="0">
+              <a:schemeClr val="accent1"/>
+            </a:fillRef>
+            <a:effectRef idx="0">
+              <a:schemeClr val="accent1"/>
+            </a:effectRef>
+            <a:fontRef idx="minor">
+              <a:schemeClr val="tx1"/>
+            </a:fontRef>
+          </p:style>
+        </p:cxnSp>
+        <p:cxnSp>
+          <p:nvCxnSpPr>
+            <p:cNvPr id="131" name="Conector reto 130"/>
+            <p:cNvCxnSpPr/>
+            <p:nvPr/>
+          </p:nvCxnSpPr>
+          <p:spPr>
+            <a:xfrm>
+              <a:off x="5488788" y="4149080"/>
+              <a:ext cx="2519960" cy="0"/>
+            </a:xfrm>
+            <a:prstGeom prst="line">
+              <a:avLst/>
+            </a:prstGeom>
+            <a:ln w="28575">
+              <a:solidFill>
+                <a:schemeClr val="tx1"/>
+              </a:solidFill>
+              <a:prstDash val="sysDash"/>
+            </a:ln>
+          </p:spPr>
+          <p:style>
+            <a:lnRef idx="1">
+              <a:schemeClr val="accent1"/>
+            </a:lnRef>
+            <a:fillRef idx="0">
+              <a:schemeClr val="accent1"/>
+            </a:fillRef>
+            <a:effectRef idx="0">
+              <a:schemeClr val="accent1"/>
+            </a:effectRef>
+            <a:fontRef idx="minor">
+              <a:schemeClr val="tx1"/>
+            </a:fontRef>
+          </p:style>
+        </p:cxnSp>
+      </p:grpSp>
+      <p:sp>
+        <p:nvSpPr>
+          <p:cNvPr id="27" name="CaixaDeTexto 26"/>
+          <p:cNvSpPr txBox="1"/>
+          <p:nvPr/>
+        </p:nvSpPr>
+        <p:spPr>
+          <a:xfrm>
+            <a:off x="1400962" y="1484784"/>
+            <a:ext cx="434734" cy="584775"/>
+          </a:xfrm>
+          <a:prstGeom prst="rect">
+            <a:avLst/>
+          </a:prstGeom>
+          <a:noFill/>
+        </p:spPr>
+        <p:txBody>
+          <a:bodyPr wrap="none" rtlCol="0">
+            <a:spAutoFit/>
+          </a:bodyPr>
+          <a:lstStyle/>
+          <a:p>
+            <a:r>
+              <a:rPr lang="pt-BR" sz="3200" i="1" dirty="0" smtClean="0">
+                <a:latin typeface="Times New Roman" panose="02020603050405020304" pitchFamily="18" charset="0"/>
+                <a:cs typeface="Times New Roman" panose="02020603050405020304" pitchFamily="18" charset="0"/>
+              </a:rPr>
+              <a:t>A</a:t>
+            </a:r>
+            <a:endParaRPr lang="pt-BR" sz="3200" i="1" dirty="0">
+              <a:latin typeface="Times New Roman" panose="02020603050405020304" pitchFamily="18" charset="0"/>
+              <a:cs typeface="Times New Roman" panose="02020603050405020304" pitchFamily="18" charset="0"/>
+            </a:endParaRPr>
+          </a:p>
+        </p:txBody>
+      </p:sp>
+      <p:sp>
+        <p:nvSpPr>
+          <p:cNvPr id="132" name="CaixaDeTexto 131"/>
+          <p:cNvSpPr txBox="1"/>
+          <p:nvPr/>
+        </p:nvSpPr>
+        <p:spPr>
+          <a:xfrm>
+            <a:off x="5479515" y="4221088"/>
+            <a:ext cx="604653" cy="523220"/>
+          </a:xfrm>
+          <a:prstGeom prst="rect">
+            <a:avLst/>
+          </a:prstGeom>
+          <a:noFill/>
+        </p:spPr>
+        <p:txBody>
+          <a:bodyPr wrap="none" rtlCol="0">
+            <a:spAutoFit/>
+          </a:bodyPr>
+          <a:lstStyle/>
+          <a:p>
+            <a:r>
+              <a:rPr lang="pt-BR" sz="2800" dirty="0" smtClean="0">
+                <a:latin typeface="Arial" panose="020B0604020202020204" pitchFamily="34" charset="0"/>
+                <a:cs typeface="Arial" panose="020B0604020202020204" pitchFamily="34" charset="0"/>
+              </a:rPr>
+              <a:t>(c)</a:t>
+            </a:r>
+            <a:endParaRPr lang="pt-BR" sz="2800" dirty="0">
+              <a:latin typeface="Arial" panose="020B0604020202020204" pitchFamily="34" charset="0"/>
+              <a:cs typeface="Arial" panose="020B0604020202020204" pitchFamily="34" charset="0"/>
+            </a:endParaRPr>
+          </a:p>
+        </p:txBody>
+      </p:sp>
+      <p:sp>
+        <p:nvSpPr>
+          <p:cNvPr id="28" name="Retângulo 27"/>
+          <p:cNvSpPr/>
+          <p:nvPr/>
+        </p:nvSpPr>
+        <p:spPr>
+          <a:xfrm>
+            <a:off x="6300372" y="4581128"/>
+            <a:ext cx="1439980" cy="1440160"/>
+          </a:xfrm>
+          <a:prstGeom prst="rect">
+            <a:avLst/>
+          </a:prstGeom>
+          <a:solidFill>
+            <a:schemeClr val="bg1">
+              <a:lumMod val="95000"/>
+            </a:schemeClr>
+          </a:solidFill>
+          <a:ln w="28575">
+            <a:solidFill>
+              <a:schemeClr val="tx1"/>
+            </a:solidFill>
+            <a:prstDash val="sysDash"/>
+          </a:ln>
+        </p:spPr>
+        <p:style>
+          <a:lnRef idx="2">
+            <a:schemeClr val="accent1">
+              <a:shade val="50000"/>
+            </a:schemeClr>
+          </a:lnRef>
+          <a:fillRef idx="1">
+            <a:schemeClr val="accent1"/>
+          </a:fillRef>
+          <a:effectRef idx="0">
+            <a:schemeClr val="accent1"/>
+          </a:effectRef>
+          <a:fontRef idx="minor">
+            <a:schemeClr val="lt1"/>
+          </a:fontRef>
+        </p:style>
+        <p:txBody>
+          <a:bodyPr rtlCol="0" anchor="ctr"/>
+          <a:lstStyle/>
+          <a:p>
+            <a:pPr algn="ctr"/>
+            <a:endParaRPr lang="pt-BR"/>
+          </a:p>
+        </p:txBody>
+      </p:sp>
+      <p:sp>
+        <p:nvSpPr>
+          <p:cNvPr id="133" name="Elipse 132"/>
+          <p:cNvSpPr/>
+          <p:nvPr/>
+        </p:nvSpPr>
+        <p:spPr>
+          <a:xfrm>
+            <a:off x="6948414" y="5229208"/>
+            <a:ext cx="143896" cy="144000"/>
+          </a:xfrm>
+          <a:prstGeom prst="ellipse">
+            <a:avLst/>
+          </a:prstGeom>
+          <a:noFill/>
+          <a:ln>
+            <a:solidFill>
+              <a:schemeClr val="tx1"/>
+            </a:solidFill>
+          </a:ln>
+        </p:spPr>
+        <p:style>
+          <a:lnRef idx="2">
+            <a:schemeClr val="accent1">
+              <a:shade val="50000"/>
+            </a:schemeClr>
+          </a:lnRef>
+          <a:fillRef idx="1">
+            <a:schemeClr val="accent1"/>
+          </a:fillRef>
+          <a:effectRef idx="0">
+            <a:schemeClr val="accent1"/>
+          </a:effectRef>
+          <a:fontRef idx="minor">
+            <a:schemeClr val="lt1"/>
+          </a:fontRef>
+        </p:style>
+        <p:txBody>
+          <a:bodyPr rtlCol="0" anchor="ctr"/>
+          <a:lstStyle/>
+          <a:p>
+            <a:pPr algn="ctr"/>
+            <a:endParaRPr lang="pt-BR">
+              <a:ln>
+                <a:solidFill>
+                  <a:sysClr val="windowText" lastClr="000000"/>
+                </a:solidFill>
+              </a:ln>
+              <a:solidFill>
+                <a:sysClr val="windowText" lastClr="000000"/>
+              </a:solidFill>
+            </a:endParaRPr>
+          </a:p>
+        </p:txBody>
+      </p:sp>
+    </p:spTree>
+    <p:extLst>
+      <p:ext uri="{BB962C8B-B14F-4D97-AF65-F5344CB8AC3E}">
+        <p14:creationId xmlns:p14="http://schemas.microsoft.com/office/powerpoint/2010/main" val="4228780538"/>
       </p:ext>
     </p:extLst>
   </p:cSld>

</xml_diff>

<commit_message>
compatibiliza o texto sobre a area do sensor com o resto do manuscrito
</commit_message>
<xml_diff>
--- a/manuscript/Figs/Aspectos_geometricos.pptx
+++ b/manuscript/Figs/Aspectos_geometricos.pptx
@@ -203,7 +203,7 @@
           <a:p>
             <a:fld id="{A72D0A6C-9BA5-4E32-9F58-11F27415CF1A}" type="datetimeFigureOut">
               <a:rPr lang="pt-BR" smtClean="0"/>
-              <a:t>14/06/2016</a:t>
+              <a:t>15/06/2016</a:t>
             </a:fld>
             <a:endParaRPr lang="pt-BR"/>
           </a:p>
@@ -1465,7 +1465,7 @@
           <a:p>
             <a:fld id="{59E0689A-8B4C-40D5-AF15-5E1194025FEE}" type="datetimeFigureOut">
               <a:rPr lang="pt-BR" smtClean="0"/>
-              <a:t>14/06/2016</a:t>
+              <a:t>15/06/2016</a:t>
             </a:fld>
             <a:endParaRPr lang="pt-BR"/>
           </a:p>
@@ -1635,7 +1635,7 @@
           <a:p>
             <a:fld id="{59E0689A-8B4C-40D5-AF15-5E1194025FEE}" type="datetimeFigureOut">
               <a:rPr lang="pt-BR" smtClean="0"/>
-              <a:t>14/06/2016</a:t>
+              <a:t>15/06/2016</a:t>
             </a:fld>
             <a:endParaRPr lang="pt-BR"/>
           </a:p>
@@ -1815,7 +1815,7 @@
           <a:p>
             <a:fld id="{59E0689A-8B4C-40D5-AF15-5E1194025FEE}" type="datetimeFigureOut">
               <a:rPr lang="pt-BR" smtClean="0"/>
-              <a:t>14/06/2016</a:t>
+              <a:t>15/06/2016</a:t>
             </a:fld>
             <a:endParaRPr lang="pt-BR"/>
           </a:p>
@@ -1985,7 +1985,7 @@
           <a:p>
             <a:fld id="{59E0689A-8B4C-40D5-AF15-5E1194025FEE}" type="datetimeFigureOut">
               <a:rPr lang="pt-BR" smtClean="0"/>
-              <a:t>14/06/2016</a:t>
+              <a:t>15/06/2016</a:t>
             </a:fld>
             <a:endParaRPr lang="pt-BR"/>
           </a:p>
@@ -2231,7 +2231,7 @@
           <a:p>
             <a:fld id="{59E0689A-8B4C-40D5-AF15-5E1194025FEE}" type="datetimeFigureOut">
               <a:rPr lang="pt-BR" smtClean="0"/>
-              <a:t>14/06/2016</a:t>
+              <a:t>15/06/2016</a:t>
             </a:fld>
             <a:endParaRPr lang="pt-BR"/>
           </a:p>
@@ -2519,7 +2519,7 @@
           <a:p>
             <a:fld id="{59E0689A-8B4C-40D5-AF15-5E1194025FEE}" type="datetimeFigureOut">
               <a:rPr lang="pt-BR" smtClean="0"/>
-              <a:t>14/06/2016</a:t>
+              <a:t>15/06/2016</a:t>
             </a:fld>
             <a:endParaRPr lang="pt-BR"/>
           </a:p>
@@ -2941,7 +2941,7 @@
           <a:p>
             <a:fld id="{59E0689A-8B4C-40D5-AF15-5E1194025FEE}" type="datetimeFigureOut">
               <a:rPr lang="pt-BR" smtClean="0"/>
-              <a:t>14/06/2016</a:t>
+              <a:t>15/06/2016</a:t>
             </a:fld>
             <a:endParaRPr lang="pt-BR"/>
           </a:p>
@@ -3059,7 +3059,7 @@
           <a:p>
             <a:fld id="{59E0689A-8B4C-40D5-AF15-5E1194025FEE}" type="datetimeFigureOut">
               <a:rPr lang="pt-BR" smtClean="0"/>
-              <a:t>14/06/2016</a:t>
+              <a:t>15/06/2016</a:t>
             </a:fld>
             <a:endParaRPr lang="pt-BR"/>
           </a:p>
@@ -3154,7 +3154,7 @@
           <a:p>
             <a:fld id="{59E0689A-8B4C-40D5-AF15-5E1194025FEE}" type="datetimeFigureOut">
               <a:rPr lang="pt-BR" smtClean="0"/>
-              <a:t>14/06/2016</a:t>
+              <a:t>15/06/2016</a:t>
             </a:fld>
             <a:endParaRPr lang="pt-BR"/>
           </a:p>
@@ -3431,7 +3431,7 @@
           <a:p>
             <a:fld id="{59E0689A-8B4C-40D5-AF15-5E1194025FEE}" type="datetimeFigureOut">
               <a:rPr lang="pt-BR" smtClean="0"/>
-              <a:t>14/06/2016</a:t>
+              <a:t>15/06/2016</a:t>
             </a:fld>
             <a:endParaRPr lang="pt-BR"/>
           </a:p>
@@ -3684,7 +3684,7 @@
           <a:p>
             <a:fld id="{59E0689A-8B4C-40D5-AF15-5E1194025FEE}" type="datetimeFigureOut">
               <a:rPr lang="pt-BR" smtClean="0"/>
-              <a:t>14/06/2016</a:t>
+              <a:t>15/06/2016</a:t>
             </a:fld>
             <a:endParaRPr lang="pt-BR"/>
           </a:p>
@@ -3897,7 +3897,7 @@
           <a:p>
             <a:fld id="{59E0689A-8B4C-40D5-AF15-5E1194025FEE}" type="datetimeFigureOut">
               <a:rPr lang="pt-BR" smtClean="0"/>
-              <a:t>14/06/2016</a:t>
+              <a:t>15/06/2016</a:t>
             </a:fld>
             <a:endParaRPr lang="pt-BR"/>
           </a:p>
@@ -8478,7 +8478,7 @@
         </p:nvSpPr>
         <p:spPr>
           <a:xfrm>
-            <a:off x="5724408" y="764984"/>
+            <a:off x="5580112" y="1773096"/>
             <a:ext cx="2520000" cy="2520000"/>
           </a:xfrm>
           <a:prstGeom prst="rect">
@@ -8528,7 +8528,7 @@
         </p:nvSpPr>
         <p:spPr>
           <a:xfrm>
-            <a:off x="4810604" y="620968"/>
+            <a:off x="6671662" y="4994012"/>
             <a:ext cx="625492" cy="523220"/>
           </a:xfrm>
           <a:prstGeom prst="rect">
@@ -8564,7 +8564,7 @@
         </p:nvSpPr>
         <p:spPr>
           <a:xfrm>
-            <a:off x="6912460" y="1952984"/>
+            <a:off x="6768164" y="2961096"/>
             <a:ext cx="143896" cy="144000"/>
           </a:xfrm>
           <a:prstGeom prst="ellipse">
@@ -8621,7 +8621,7 @@
         </p:nvGrpSpPr>
         <p:grpSpPr>
           <a:xfrm>
-            <a:off x="5724428" y="1124864"/>
+            <a:off x="5580132" y="2132976"/>
             <a:ext cx="2519960" cy="1800240"/>
             <a:chOff x="5488788" y="2348840"/>
             <a:chExt cx="2519960" cy="1800240"/>
@@ -8852,7 +8852,7 @@
         </p:nvGrpSpPr>
         <p:grpSpPr>
           <a:xfrm rot="5400000">
-            <a:off x="5724428" y="1124864"/>
+            <a:off x="5580132" y="2132976"/>
             <a:ext cx="2519960" cy="1800240"/>
             <a:chOff x="5488788" y="2348840"/>
             <a:chExt cx="2519960" cy="1800240"/>
@@ -9111,148 +9111,2751 @@
           </a:p>
         </p:txBody>
       </p:sp>
-      <p:sp>
-        <p:nvSpPr>
-          <p:cNvPr id="132" name="CaixaDeTexto 131"/>
-          <p:cNvSpPr txBox="1"/>
+      <p:grpSp>
+        <p:nvGrpSpPr>
+          <p:cNvPr id="2" name="Grupo 1"/>
+          <p:cNvGrpSpPr/>
           <p:nvPr/>
-        </p:nvSpPr>
-        <p:spPr>
+        </p:nvGrpSpPr>
+        <p:grpSpPr>
           <a:xfrm>
-            <a:off x="5479515" y="4221088"/>
-            <a:ext cx="604653" cy="523220"/>
+            <a:off x="5694367" y="4045027"/>
+            <a:ext cx="2274253" cy="108000"/>
+            <a:chOff x="5696010" y="4045027"/>
+            <a:chExt cx="2274253" cy="108000"/>
           </a:xfrm>
-          <a:prstGeom prst="rect">
-            <a:avLst/>
-          </a:prstGeom>
-          <a:noFill/>
-        </p:spPr>
-        <p:txBody>
-          <a:bodyPr wrap="none" rtlCol="0">
-            <a:spAutoFit/>
-          </a:bodyPr>
-          <a:lstStyle/>
-          <a:p>
-            <a:r>
-              <a:rPr lang="pt-BR" sz="2800" dirty="0" smtClean="0">
-                <a:latin typeface="Arial" panose="020B0604020202020204" pitchFamily="34" charset="0"/>
-                <a:cs typeface="Arial" panose="020B0604020202020204" pitchFamily="34" charset="0"/>
-              </a:rPr>
-              <a:t>(c)</a:t>
-            </a:r>
-            <a:endParaRPr lang="pt-BR" sz="2800" dirty="0">
-              <a:latin typeface="Arial" panose="020B0604020202020204" pitchFamily="34" charset="0"/>
-              <a:cs typeface="Arial" panose="020B0604020202020204" pitchFamily="34" charset="0"/>
-            </a:endParaRPr>
-          </a:p>
-        </p:txBody>
-      </p:sp>
-      <p:sp>
-        <p:nvSpPr>
-          <p:cNvPr id="28" name="Retângulo 27"/>
-          <p:cNvSpPr/>
-          <p:nvPr/>
-        </p:nvSpPr>
-        <p:spPr>
-          <a:xfrm>
-            <a:off x="6300372" y="4581128"/>
-            <a:ext cx="1439980" cy="1440160"/>
-          </a:xfrm>
-          <a:prstGeom prst="rect">
-            <a:avLst/>
-          </a:prstGeom>
-          <a:solidFill>
-            <a:schemeClr val="bg1">
-              <a:lumMod val="95000"/>
-            </a:schemeClr>
-          </a:solidFill>
-          <a:ln w="28575">
-            <a:solidFill>
-              <a:schemeClr val="tx1"/>
-            </a:solidFill>
-            <a:prstDash val="sysDash"/>
-          </a:ln>
-        </p:spPr>
-        <p:style>
-          <a:lnRef idx="2">
-            <a:schemeClr val="accent1">
-              <a:shade val="50000"/>
-            </a:schemeClr>
-          </a:lnRef>
-          <a:fillRef idx="1">
-            <a:schemeClr val="accent1"/>
-          </a:fillRef>
-          <a:effectRef idx="0">
-            <a:schemeClr val="accent1"/>
-          </a:effectRef>
-          <a:fontRef idx="minor">
-            <a:schemeClr val="lt1"/>
-          </a:fontRef>
-        </p:style>
-        <p:txBody>
-          <a:bodyPr rtlCol="0" anchor="ctr"/>
-          <a:lstStyle/>
-          <a:p>
-            <a:pPr algn="ctr"/>
-            <a:endParaRPr lang="pt-BR"/>
-          </a:p>
-        </p:txBody>
-      </p:sp>
-      <p:sp>
-        <p:nvSpPr>
-          <p:cNvPr id="133" name="Elipse 132"/>
-          <p:cNvSpPr/>
-          <p:nvPr/>
-        </p:nvSpPr>
-        <p:spPr>
-          <a:xfrm>
-            <a:off x="6948414" y="5229208"/>
-            <a:ext cx="143896" cy="144000"/>
-          </a:xfrm>
-          <a:prstGeom prst="ellipse">
-            <a:avLst/>
-          </a:prstGeom>
-          <a:noFill/>
-          <a:ln>
-            <a:solidFill>
-              <a:schemeClr val="tx1"/>
-            </a:solidFill>
-          </a:ln>
-        </p:spPr>
-        <p:style>
-          <a:lnRef idx="2">
-            <a:schemeClr val="accent1">
-              <a:shade val="50000"/>
-            </a:schemeClr>
-          </a:lnRef>
-          <a:fillRef idx="1">
-            <a:schemeClr val="accent1"/>
-          </a:fillRef>
-          <a:effectRef idx="0">
-            <a:schemeClr val="accent1"/>
-          </a:effectRef>
-          <a:fontRef idx="minor">
-            <a:schemeClr val="lt1"/>
-          </a:fontRef>
-        </p:style>
-        <p:txBody>
-          <a:bodyPr rtlCol="0" anchor="ctr"/>
-          <a:lstStyle/>
-          <a:p>
-            <a:pPr algn="ctr"/>
-            <a:endParaRPr lang="pt-BR">
-              <a:ln>
+        </p:grpSpPr>
+        <p:sp>
+          <p:nvSpPr>
+            <p:cNvPr id="32" name="Elipse 31"/>
+            <p:cNvSpPr/>
+            <p:nvPr/>
+          </p:nvSpPr>
+          <p:spPr>
+            <a:xfrm>
+              <a:off x="7862263" y="4045027"/>
+              <a:ext cx="108000" cy="108000"/>
+            </a:xfrm>
+            <a:prstGeom prst="ellipse">
+              <a:avLst/>
+            </a:prstGeom>
+            <a:noFill/>
+            <a:ln>
+              <a:solidFill>
+                <a:schemeClr val="tx1"/>
+              </a:solidFill>
+            </a:ln>
+          </p:spPr>
+          <p:style>
+            <a:lnRef idx="2">
+              <a:schemeClr val="accent1">
+                <a:shade val="50000"/>
+              </a:schemeClr>
+            </a:lnRef>
+            <a:fillRef idx="1">
+              <a:schemeClr val="accent1"/>
+            </a:fillRef>
+            <a:effectRef idx="0">
+              <a:schemeClr val="accent1"/>
+            </a:effectRef>
+            <a:fontRef idx="minor">
+              <a:schemeClr val="lt1"/>
+            </a:fontRef>
+          </p:style>
+          <p:txBody>
+            <a:bodyPr rtlCol="0" anchor="ctr"/>
+            <a:lstStyle/>
+            <a:p>
+              <a:pPr algn="ctr"/>
+              <a:endParaRPr lang="pt-BR">
+                <a:ln>
+                  <a:solidFill>
+                    <a:sysClr val="windowText" lastClr="000000"/>
+                  </a:solidFill>
+                </a:ln>
                 <a:solidFill>
                   <a:sysClr val="windowText" lastClr="000000"/>
                 </a:solidFill>
-              </a:ln>
+              </a:endParaRPr>
+            </a:p>
+          </p:txBody>
+        </p:sp>
+        <p:sp>
+          <p:nvSpPr>
+            <p:cNvPr id="33" name="Elipse 32"/>
+            <p:cNvSpPr/>
+            <p:nvPr/>
+          </p:nvSpPr>
+          <p:spPr>
+            <a:xfrm>
+              <a:off x="5696010" y="4045027"/>
+              <a:ext cx="108000" cy="108000"/>
+            </a:xfrm>
+            <a:prstGeom prst="ellipse">
+              <a:avLst/>
+            </a:prstGeom>
+            <a:noFill/>
+            <a:ln>
               <a:solidFill>
-                <a:sysClr val="windowText" lastClr="000000"/>
+                <a:schemeClr val="tx1"/>
               </a:solidFill>
-            </a:endParaRPr>
-          </a:p>
-        </p:txBody>
-      </p:sp>
+            </a:ln>
+          </p:spPr>
+          <p:style>
+            <a:lnRef idx="2">
+              <a:schemeClr val="accent1">
+                <a:shade val="50000"/>
+              </a:schemeClr>
+            </a:lnRef>
+            <a:fillRef idx="1">
+              <a:schemeClr val="accent1"/>
+            </a:fillRef>
+            <a:effectRef idx="0">
+              <a:schemeClr val="accent1"/>
+            </a:effectRef>
+            <a:fontRef idx="minor">
+              <a:schemeClr val="lt1"/>
+            </a:fontRef>
+          </p:style>
+          <p:txBody>
+            <a:bodyPr rtlCol="0" anchor="ctr"/>
+            <a:lstStyle/>
+            <a:p>
+              <a:pPr algn="ctr"/>
+              <a:endParaRPr lang="pt-BR">
+                <a:ln>
+                  <a:solidFill>
+                    <a:sysClr val="windowText" lastClr="000000"/>
+                  </a:solidFill>
+                </a:ln>
+                <a:solidFill>
+                  <a:sysClr val="windowText" lastClr="000000"/>
+                </a:solidFill>
+              </a:endParaRPr>
+            </a:p>
+          </p:txBody>
+        </p:sp>
+        <p:sp>
+          <p:nvSpPr>
+            <p:cNvPr id="34" name="Elipse 33"/>
+            <p:cNvSpPr/>
+            <p:nvPr/>
+          </p:nvSpPr>
+          <p:spPr>
+            <a:xfrm>
+              <a:off x="7501220" y="4045027"/>
+              <a:ext cx="108000" cy="108000"/>
+            </a:xfrm>
+            <a:prstGeom prst="ellipse">
+              <a:avLst/>
+            </a:prstGeom>
+            <a:noFill/>
+            <a:ln>
+              <a:solidFill>
+                <a:schemeClr val="tx1"/>
+              </a:solidFill>
+            </a:ln>
+          </p:spPr>
+          <p:style>
+            <a:lnRef idx="2">
+              <a:schemeClr val="accent1">
+                <a:shade val="50000"/>
+              </a:schemeClr>
+            </a:lnRef>
+            <a:fillRef idx="1">
+              <a:schemeClr val="accent1"/>
+            </a:fillRef>
+            <a:effectRef idx="0">
+              <a:schemeClr val="accent1"/>
+            </a:effectRef>
+            <a:fontRef idx="minor">
+              <a:schemeClr val="lt1"/>
+            </a:fontRef>
+          </p:style>
+          <p:txBody>
+            <a:bodyPr rtlCol="0" anchor="ctr"/>
+            <a:lstStyle/>
+            <a:p>
+              <a:pPr algn="ctr"/>
+              <a:endParaRPr lang="pt-BR">
+                <a:ln>
+                  <a:solidFill>
+                    <a:sysClr val="windowText" lastClr="000000"/>
+                  </a:solidFill>
+                </a:ln>
+                <a:solidFill>
+                  <a:sysClr val="windowText" lastClr="000000"/>
+                </a:solidFill>
+              </a:endParaRPr>
+            </a:p>
+          </p:txBody>
+        </p:sp>
+        <p:sp>
+          <p:nvSpPr>
+            <p:cNvPr id="35" name="Elipse 34"/>
+            <p:cNvSpPr/>
+            <p:nvPr/>
+          </p:nvSpPr>
+          <p:spPr>
+            <a:xfrm>
+              <a:off x="7140178" y="4045027"/>
+              <a:ext cx="108000" cy="108000"/>
+            </a:xfrm>
+            <a:prstGeom prst="ellipse">
+              <a:avLst/>
+            </a:prstGeom>
+            <a:noFill/>
+            <a:ln>
+              <a:solidFill>
+                <a:schemeClr val="tx1"/>
+              </a:solidFill>
+            </a:ln>
+          </p:spPr>
+          <p:style>
+            <a:lnRef idx="2">
+              <a:schemeClr val="accent1">
+                <a:shade val="50000"/>
+              </a:schemeClr>
+            </a:lnRef>
+            <a:fillRef idx="1">
+              <a:schemeClr val="accent1"/>
+            </a:fillRef>
+            <a:effectRef idx="0">
+              <a:schemeClr val="accent1"/>
+            </a:effectRef>
+            <a:fontRef idx="minor">
+              <a:schemeClr val="lt1"/>
+            </a:fontRef>
+          </p:style>
+          <p:txBody>
+            <a:bodyPr rtlCol="0" anchor="ctr"/>
+            <a:lstStyle/>
+            <a:p>
+              <a:pPr algn="ctr"/>
+              <a:endParaRPr lang="pt-BR">
+                <a:ln>
+                  <a:solidFill>
+                    <a:sysClr val="windowText" lastClr="000000"/>
+                  </a:solidFill>
+                </a:ln>
+                <a:solidFill>
+                  <a:sysClr val="windowText" lastClr="000000"/>
+                </a:solidFill>
+              </a:endParaRPr>
+            </a:p>
+          </p:txBody>
+        </p:sp>
+        <p:sp>
+          <p:nvSpPr>
+            <p:cNvPr id="36" name="Elipse 35"/>
+            <p:cNvSpPr/>
+            <p:nvPr/>
+          </p:nvSpPr>
+          <p:spPr>
+            <a:xfrm>
+              <a:off x="6779136" y="4045027"/>
+              <a:ext cx="108000" cy="108000"/>
+            </a:xfrm>
+            <a:prstGeom prst="ellipse">
+              <a:avLst/>
+            </a:prstGeom>
+            <a:noFill/>
+            <a:ln>
+              <a:solidFill>
+                <a:schemeClr val="tx1"/>
+              </a:solidFill>
+            </a:ln>
+          </p:spPr>
+          <p:style>
+            <a:lnRef idx="2">
+              <a:schemeClr val="accent1">
+                <a:shade val="50000"/>
+              </a:schemeClr>
+            </a:lnRef>
+            <a:fillRef idx="1">
+              <a:schemeClr val="accent1"/>
+            </a:fillRef>
+            <a:effectRef idx="0">
+              <a:schemeClr val="accent1"/>
+            </a:effectRef>
+            <a:fontRef idx="minor">
+              <a:schemeClr val="lt1"/>
+            </a:fontRef>
+          </p:style>
+          <p:txBody>
+            <a:bodyPr rtlCol="0" anchor="ctr"/>
+            <a:lstStyle/>
+            <a:p>
+              <a:pPr algn="ctr"/>
+              <a:endParaRPr lang="pt-BR">
+                <a:ln>
+                  <a:solidFill>
+                    <a:sysClr val="windowText" lastClr="000000"/>
+                  </a:solidFill>
+                </a:ln>
+                <a:solidFill>
+                  <a:sysClr val="windowText" lastClr="000000"/>
+                </a:solidFill>
+              </a:endParaRPr>
+            </a:p>
+          </p:txBody>
+        </p:sp>
+        <p:sp>
+          <p:nvSpPr>
+            <p:cNvPr id="37" name="Elipse 36"/>
+            <p:cNvSpPr/>
+            <p:nvPr/>
+          </p:nvSpPr>
+          <p:spPr>
+            <a:xfrm>
+              <a:off x="6418094" y="4045027"/>
+              <a:ext cx="108000" cy="108000"/>
+            </a:xfrm>
+            <a:prstGeom prst="ellipse">
+              <a:avLst/>
+            </a:prstGeom>
+            <a:noFill/>
+            <a:ln>
+              <a:solidFill>
+                <a:schemeClr val="tx1"/>
+              </a:solidFill>
+            </a:ln>
+          </p:spPr>
+          <p:style>
+            <a:lnRef idx="2">
+              <a:schemeClr val="accent1">
+                <a:shade val="50000"/>
+              </a:schemeClr>
+            </a:lnRef>
+            <a:fillRef idx="1">
+              <a:schemeClr val="accent1"/>
+            </a:fillRef>
+            <a:effectRef idx="0">
+              <a:schemeClr val="accent1"/>
+            </a:effectRef>
+            <a:fontRef idx="minor">
+              <a:schemeClr val="lt1"/>
+            </a:fontRef>
+          </p:style>
+          <p:txBody>
+            <a:bodyPr rtlCol="0" anchor="ctr"/>
+            <a:lstStyle/>
+            <a:p>
+              <a:pPr algn="ctr"/>
+              <a:endParaRPr lang="pt-BR">
+                <a:ln>
+                  <a:solidFill>
+                    <a:sysClr val="windowText" lastClr="000000"/>
+                  </a:solidFill>
+                </a:ln>
+                <a:solidFill>
+                  <a:sysClr val="windowText" lastClr="000000"/>
+                </a:solidFill>
+              </a:endParaRPr>
+            </a:p>
+          </p:txBody>
+        </p:sp>
+        <p:sp>
+          <p:nvSpPr>
+            <p:cNvPr id="38" name="Elipse 37"/>
+            <p:cNvSpPr/>
+            <p:nvPr/>
+          </p:nvSpPr>
+          <p:spPr>
+            <a:xfrm>
+              <a:off x="6057052" y="4045027"/>
+              <a:ext cx="108000" cy="108000"/>
+            </a:xfrm>
+            <a:prstGeom prst="ellipse">
+              <a:avLst/>
+            </a:prstGeom>
+            <a:noFill/>
+            <a:ln>
+              <a:solidFill>
+                <a:schemeClr val="tx1"/>
+              </a:solidFill>
+            </a:ln>
+          </p:spPr>
+          <p:style>
+            <a:lnRef idx="2">
+              <a:schemeClr val="accent1">
+                <a:shade val="50000"/>
+              </a:schemeClr>
+            </a:lnRef>
+            <a:fillRef idx="1">
+              <a:schemeClr val="accent1"/>
+            </a:fillRef>
+            <a:effectRef idx="0">
+              <a:schemeClr val="accent1"/>
+            </a:effectRef>
+            <a:fontRef idx="minor">
+              <a:schemeClr val="lt1"/>
+            </a:fontRef>
+          </p:style>
+          <p:txBody>
+            <a:bodyPr rtlCol="0" anchor="ctr"/>
+            <a:lstStyle/>
+            <a:p>
+              <a:pPr algn="ctr"/>
+              <a:endParaRPr lang="pt-BR">
+                <a:ln>
+                  <a:solidFill>
+                    <a:sysClr val="windowText" lastClr="000000"/>
+                  </a:solidFill>
+                </a:ln>
+                <a:solidFill>
+                  <a:sysClr val="windowText" lastClr="000000"/>
+                </a:solidFill>
+              </a:endParaRPr>
+            </a:p>
+          </p:txBody>
+        </p:sp>
+      </p:grpSp>
+      <p:grpSp>
+        <p:nvGrpSpPr>
+          <p:cNvPr id="40" name="Grupo 39"/>
+          <p:cNvGrpSpPr/>
+          <p:nvPr/>
+        </p:nvGrpSpPr>
+        <p:grpSpPr>
+          <a:xfrm>
+            <a:off x="5694367" y="1887572"/>
+            <a:ext cx="2274253" cy="108000"/>
+            <a:chOff x="5696010" y="4045027"/>
+            <a:chExt cx="2274253" cy="108000"/>
+          </a:xfrm>
+        </p:grpSpPr>
+        <p:sp>
+          <p:nvSpPr>
+            <p:cNvPr id="41" name="Elipse 40"/>
+            <p:cNvSpPr/>
+            <p:nvPr/>
+          </p:nvSpPr>
+          <p:spPr>
+            <a:xfrm>
+              <a:off x="7862263" y="4045027"/>
+              <a:ext cx="108000" cy="108000"/>
+            </a:xfrm>
+            <a:prstGeom prst="ellipse">
+              <a:avLst/>
+            </a:prstGeom>
+            <a:noFill/>
+            <a:ln>
+              <a:solidFill>
+                <a:schemeClr val="tx1"/>
+              </a:solidFill>
+            </a:ln>
+          </p:spPr>
+          <p:style>
+            <a:lnRef idx="2">
+              <a:schemeClr val="accent1">
+                <a:shade val="50000"/>
+              </a:schemeClr>
+            </a:lnRef>
+            <a:fillRef idx="1">
+              <a:schemeClr val="accent1"/>
+            </a:fillRef>
+            <a:effectRef idx="0">
+              <a:schemeClr val="accent1"/>
+            </a:effectRef>
+            <a:fontRef idx="minor">
+              <a:schemeClr val="lt1"/>
+            </a:fontRef>
+          </p:style>
+          <p:txBody>
+            <a:bodyPr rtlCol="0" anchor="ctr"/>
+            <a:lstStyle/>
+            <a:p>
+              <a:pPr algn="ctr"/>
+              <a:endParaRPr lang="pt-BR">
+                <a:ln>
+                  <a:solidFill>
+                    <a:sysClr val="windowText" lastClr="000000"/>
+                  </a:solidFill>
+                </a:ln>
+                <a:solidFill>
+                  <a:sysClr val="windowText" lastClr="000000"/>
+                </a:solidFill>
+              </a:endParaRPr>
+            </a:p>
+          </p:txBody>
+        </p:sp>
+        <p:sp>
+          <p:nvSpPr>
+            <p:cNvPr id="42" name="Elipse 41"/>
+            <p:cNvSpPr/>
+            <p:nvPr/>
+          </p:nvSpPr>
+          <p:spPr>
+            <a:xfrm>
+              <a:off x="5696010" y="4045027"/>
+              <a:ext cx="108000" cy="108000"/>
+            </a:xfrm>
+            <a:prstGeom prst="ellipse">
+              <a:avLst/>
+            </a:prstGeom>
+            <a:noFill/>
+            <a:ln>
+              <a:solidFill>
+                <a:schemeClr val="tx1"/>
+              </a:solidFill>
+            </a:ln>
+          </p:spPr>
+          <p:style>
+            <a:lnRef idx="2">
+              <a:schemeClr val="accent1">
+                <a:shade val="50000"/>
+              </a:schemeClr>
+            </a:lnRef>
+            <a:fillRef idx="1">
+              <a:schemeClr val="accent1"/>
+            </a:fillRef>
+            <a:effectRef idx="0">
+              <a:schemeClr val="accent1"/>
+            </a:effectRef>
+            <a:fontRef idx="minor">
+              <a:schemeClr val="lt1"/>
+            </a:fontRef>
+          </p:style>
+          <p:txBody>
+            <a:bodyPr rtlCol="0" anchor="ctr"/>
+            <a:lstStyle/>
+            <a:p>
+              <a:pPr algn="ctr"/>
+              <a:endParaRPr lang="pt-BR">
+                <a:ln>
+                  <a:solidFill>
+                    <a:sysClr val="windowText" lastClr="000000"/>
+                  </a:solidFill>
+                </a:ln>
+                <a:solidFill>
+                  <a:sysClr val="windowText" lastClr="000000"/>
+                </a:solidFill>
+              </a:endParaRPr>
+            </a:p>
+          </p:txBody>
+        </p:sp>
+        <p:sp>
+          <p:nvSpPr>
+            <p:cNvPr id="43" name="Elipse 42"/>
+            <p:cNvSpPr/>
+            <p:nvPr/>
+          </p:nvSpPr>
+          <p:spPr>
+            <a:xfrm>
+              <a:off x="7501220" y="4045027"/>
+              <a:ext cx="108000" cy="108000"/>
+            </a:xfrm>
+            <a:prstGeom prst="ellipse">
+              <a:avLst/>
+            </a:prstGeom>
+            <a:noFill/>
+            <a:ln>
+              <a:solidFill>
+                <a:schemeClr val="tx1"/>
+              </a:solidFill>
+            </a:ln>
+          </p:spPr>
+          <p:style>
+            <a:lnRef idx="2">
+              <a:schemeClr val="accent1">
+                <a:shade val="50000"/>
+              </a:schemeClr>
+            </a:lnRef>
+            <a:fillRef idx="1">
+              <a:schemeClr val="accent1"/>
+            </a:fillRef>
+            <a:effectRef idx="0">
+              <a:schemeClr val="accent1"/>
+            </a:effectRef>
+            <a:fontRef idx="minor">
+              <a:schemeClr val="lt1"/>
+            </a:fontRef>
+          </p:style>
+          <p:txBody>
+            <a:bodyPr rtlCol="0" anchor="ctr"/>
+            <a:lstStyle/>
+            <a:p>
+              <a:pPr algn="ctr"/>
+              <a:endParaRPr lang="pt-BR">
+                <a:ln>
+                  <a:solidFill>
+                    <a:sysClr val="windowText" lastClr="000000"/>
+                  </a:solidFill>
+                </a:ln>
+                <a:solidFill>
+                  <a:sysClr val="windowText" lastClr="000000"/>
+                </a:solidFill>
+              </a:endParaRPr>
+            </a:p>
+          </p:txBody>
+        </p:sp>
+        <p:sp>
+          <p:nvSpPr>
+            <p:cNvPr id="44" name="Elipse 43"/>
+            <p:cNvSpPr/>
+            <p:nvPr/>
+          </p:nvSpPr>
+          <p:spPr>
+            <a:xfrm>
+              <a:off x="7140178" y="4045027"/>
+              <a:ext cx="108000" cy="108000"/>
+            </a:xfrm>
+            <a:prstGeom prst="ellipse">
+              <a:avLst/>
+            </a:prstGeom>
+            <a:noFill/>
+            <a:ln>
+              <a:solidFill>
+                <a:schemeClr val="tx1"/>
+              </a:solidFill>
+            </a:ln>
+          </p:spPr>
+          <p:style>
+            <a:lnRef idx="2">
+              <a:schemeClr val="accent1">
+                <a:shade val="50000"/>
+              </a:schemeClr>
+            </a:lnRef>
+            <a:fillRef idx="1">
+              <a:schemeClr val="accent1"/>
+            </a:fillRef>
+            <a:effectRef idx="0">
+              <a:schemeClr val="accent1"/>
+            </a:effectRef>
+            <a:fontRef idx="minor">
+              <a:schemeClr val="lt1"/>
+            </a:fontRef>
+          </p:style>
+          <p:txBody>
+            <a:bodyPr rtlCol="0" anchor="ctr"/>
+            <a:lstStyle/>
+            <a:p>
+              <a:pPr algn="ctr"/>
+              <a:endParaRPr lang="pt-BR">
+                <a:ln>
+                  <a:solidFill>
+                    <a:sysClr val="windowText" lastClr="000000"/>
+                  </a:solidFill>
+                </a:ln>
+                <a:solidFill>
+                  <a:sysClr val="windowText" lastClr="000000"/>
+                </a:solidFill>
+              </a:endParaRPr>
+            </a:p>
+          </p:txBody>
+        </p:sp>
+        <p:sp>
+          <p:nvSpPr>
+            <p:cNvPr id="45" name="Elipse 44"/>
+            <p:cNvSpPr/>
+            <p:nvPr/>
+          </p:nvSpPr>
+          <p:spPr>
+            <a:xfrm>
+              <a:off x="6779136" y="4045027"/>
+              <a:ext cx="108000" cy="108000"/>
+            </a:xfrm>
+            <a:prstGeom prst="ellipse">
+              <a:avLst/>
+            </a:prstGeom>
+            <a:noFill/>
+            <a:ln>
+              <a:solidFill>
+                <a:schemeClr val="tx1"/>
+              </a:solidFill>
+            </a:ln>
+          </p:spPr>
+          <p:style>
+            <a:lnRef idx="2">
+              <a:schemeClr val="accent1">
+                <a:shade val="50000"/>
+              </a:schemeClr>
+            </a:lnRef>
+            <a:fillRef idx="1">
+              <a:schemeClr val="accent1"/>
+            </a:fillRef>
+            <a:effectRef idx="0">
+              <a:schemeClr val="accent1"/>
+            </a:effectRef>
+            <a:fontRef idx="minor">
+              <a:schemeClr val="lt1"/>
+            </a:fontRef>
+          </p:style>
+          <p:txBody>
+            <a:bodyPr rtlCol="0" anchor="ctr"/>
+            <a:lstStyle/>
+            <a:p>
+              <a:pPr algn="ctr"/>
+              <a:endParaRPr lang="pt-BR">
+                <a:ln>
+                  <a:solidFill>
+                    <a:sysClr val="windowText" lastClr="000000"/>
+                  </a:solidFill>
+                </a:ln>
+                <a:solidFill>
+                  <a:sysClr val="windowText" lastClr="000000"/>
+                </a:solidFill>
+              </a:endParaRPr>
+            </a:p>
+          </p:txBody>
+        </p:sp>
+        <p:sp>
+          <p:nvSpPr>
+            <p:cNvPr id="47" name="Elipse 46"/>
+            <p:cNvSpPr/>
+            <p:nvPr/>
+          </p:nvSpPr>
+          <p:spPr>
+            <a:xfrm>
+              <a:off x="6418094" y="4045027"/>
+              <a:ext cx="108000" cy="108000"/>
+            </a:xfrm>
+            <a:prstGeom prst="ellipse">
+              <a:avLst/>
+            </a:prstGeom>
+            <a:noFill/>
+            <a:ln>
+              <a:solidFill>
+                <a:schemeClr val="tx1"/>
+              </a:solidFill>
+            </a:ln>
+          </p:spPr>
+          <p:style>
+            <a:lnRef idx="2">
+              <a:schemeClr val="accent1">
+                <a:shade val="50000"/>
+              </a:schemeClr>
+            </a:lnRef>
+            <a:fillRef idx="1">
+              <a:schemeClr val="accent1"/>
+            </a:fillRef>
+            <a:effectRef idx="0">
+              <a:schemeClr val="accent1"/>
+            </a:effectRef>
+            <a:fontRef idx="minor">
+              <a:schemeClr val="lt1"/>
+            </a:fontRef>
+          </p:style>
+          <p:txBody>
+            <a:bodyPr rtlCol="0" anchor="ctr"/>
+            <a:lstStyle/>
+            <a:p>
+              <a:pPr algn="ctr"/>
+              <a:endParaRPr lang="pt-BR">
+                <a:ln>
+                  <a:solidFill>
+                    <a:sysClr val="windowText" lastClr="000000"/>
+                  </a:solidFill>
+                </a:ln>
+                <a:solidFill>
+                  <a:sysClr val="windowText" lastClr="000000"/>
+                </a:solidFill>
+              </a:endParaRPr>
+            </a:p>
+          </p:txBody>
+        </p:sp>
+        <p:sp>
+          <p:nvSpPr>
+            <p:cNvPr id="48" name="Elipse 47"/>
+            <p:cNvSpPr/>
+            <p:nvPr/>
+          </p:nvSpPr>
+          <p:spPr>
+            <a:xfrm>
+              <a:off x="6057052" y="4045027"/>
+              <a:ext cx="108000" cy="108000"/>
+            </a:xfrm>
+            <a:prstGeom prst="ellipse">
+              <a:avLst/>
+            </a:prstGeom>
+            <a:noFill/>
+            <a:ln>
+              <a:solidFill>
+                <a:schemeClr val="tx1"/>
+              </a:solidFill>
+            </a:ln>
+          </p:spPr>
+          <p:style>
+            <a:lnRef idx="2">
+              <a:schemeClr val="accent1">
+                <a:shade val="50000"/>
+              </a:schemeClr>
+            </a:lnRef>
+            <a:fillRef idx="1">
+              <a:schemeClr val="accent1"/>
+            </a:fillRef>
+            <a:effectRef idx="0">
+              <a:schemeClr val="accent1"/>
+            </a:effectRef>
+            <a:fontRef idx="minor">
+              <a:schemeClr val="lt1"/>
+            </a:fontRef>
+          </p:style>
+          <p:txBody>
+            <a:bodyPr rtlCol="0" anchor="ctr"/>
+            <a:lstStyle/>
+            <a:p>
+              <a:pPr algn="ctr"/>
+              <a:endParaRPr lang="pt-BR">
+                <a:ln>
+                  <a:solidFill>
+                    <a:sysClr val="windowText" lastClr="000000"/>
+                  </a:solidFill>
+                </a:ln>
+                <a:solidFill>
+                  <a:sysClr val="windowText" lastClr="000000"/>
+                </a:solidFill>
+              </a:endParaRPr>
+            </a:p>
+          </p:txBody>
+        </p:sp>
+      </p:grpSp>
+      <p:grpSp>
+        <p:nvGrpSpPr>
+          <p:cNvPr id="49" name="Grupo 48"/>
+          <p:cNvGrpSpPr/>
+          <p:nvPr/>
+        </p:nvGrpSpPr>
+        <p:grpSpPr>
+          <a:xfrm>
+            <a:off x="5694367" y="3685452"/>
+            <a:ext cx="2274253" cy="108000"/>
+            <a:chOff x="5696010" y="4045027"/>
+            <a:chExt cx="2274253" cy="108000"/>
+          </a:xfrm>
+        </p:grpSpPr>
+        <p:sp>
+          <p:nvSpPr>
+            <p:cNvPr id="50" name="Elipse 49"/>
+            <p:cNvSpPr/>
+            <p:nvPr/>
+          </p:nvSpPr>
+          <p:spPr>
+            <a:xfrm>
+              <a:off x="7862263" y="4045027"/>
+              <a:ext cx="108000" cy="108000"/>
+            </a:xfrm>
+            <a:prstGeom prst="ellipse">
+              <a:avLst/>
+            </a:prstGeom>
+            <a:noFill/>
+            <a:ln>
+              <a:solidFill>
+                <a:schemeClr val="tx1"/>
+              </a:solidFill>
+            </a:ln>
+          </p:spPr>
+          <p:style>
+            <a:lnRef idx="2">
+              <a:schemeClr val="accent1">
+                <a:shade val="50000"/>
+              </a:schemeClr>
+            </a:lnRef>
+            <a:fillRef idx="1">
+              <a:schemeClr val="accent1"/>
+            </a:fillRef>
+            <a:effectRef idx="0">
+              <a:schemeClr val="accent1"/>
+            </a:effectRef>
+            <a:fontRef idx="minor">
+              <a:schemeClr val="lt1"/>
+            </a:fontRef>
+          </p:style>
+          <p:txBody>
+            <a:bodyPr rtlCol="0" anchor="ctr"/>
+            <a:lstStyle/>
+            <a:p>
+              <a:pPr algn="ctr"/>
+              <a:endParaRPr lang="pt-BR">
+                <a:ln>
+                  <a:solidFill>
+                    <a:sysClr val="windowText" lastClr="000000"/>
+                  </a:solidFill>
+                </a:ln>
+                <a:solidFill>
+                  <a:sysClr val="windowText" lastClr="000000"/>
+                </a:solidFill>
+              </a:endParaRPr>
+            </a:p>
+          </p:txBody>
+        </p:sp>
+        <p:sp>
+          <p:nvSpPr>
+            <p:cNvPr id="51" name="Elipse 50"/>
+            <p:cNvSpPr/>
+            <p:nvPr/>
+          </p:nvSpPr>
+          <p:spPr>
+            <a:xfrm>
+              <a:off x="5696010" y="4045027"/>
+              <a:ext cx="108000" cy="108000"/>
+            </a:xfrm>
+            <a:prstGeom prst="ellipse">
+              <a:avLst/>
+            </a:prstGeom>
+            <a:noFill/>
+            <a:ln>
+              <a:solidFill>
+                <a:schemeClr val="tx1"/>
+              </a:solidFill>
+            </a:ln>
+          </p:spPr>
+          <p:style>
+            <a:lnRef idx="2">
+              <a:schemeClr val="accent1">
+                <a:shade val="50000"/>
+              </a:schemeClr>
+            </a:lnRef>
+            <a:fillRef idx="1">
+              <a:schemeClr val="accent1"/>
+            </a:fillRef>
+            <a:effectRef idx="0">
+              <a:schemeClr val="accent1"/>
+            </a:effectRef>
+            <a:fontRef idx="minor">
+              <a:schemeClr val="lt1"/>
+            </a:fontRef>
+          </p:style>
+          <p:txBody>
+            <a:bodyPr rtlCol="0" anchor="ctr"/>
+            <a:lstStyle/>
+            <a:p>
+              <a:pPr algn="ctr"/>
+              <a:endParaRPr lang="pt-BR">
+                <a:ln>
+                  <a:solidFill>
+                    <a:sysClr val="windowText" lastClr="000000"/>
+                  </a:solidFill>
+                </a:ln>
+                <a:solidFill>
+                  <a:sysClr val="windowText" lastClr="000000"/>
+                </a:solidFill>
+              </a:endParaRPr>
+            </a:p>
+          </p:txBody>
+        </p:sp>
+        <p:sp>
+          <p:nvSpPr>
+            <p:cNvPr id="52" name="Elipse 51"/>
+            <p:cNvSpPr/>
+            <p:nvPr/>
+          </p:nvSpPr>
+          <p:spPr>
+            <a:xfrm>
+              <a:off x="7501220" y="4045027"/>
+              <a:ext cx="108000" cy="108000"/>
+            </a:xfrm>
+            <a:prstGeom prst="ellipse">
+              <a:avLst/>
+            </a:prstGeom>
+            <a:noFill/>
+            <a:ln>
+              <a:solidFill>
+                <a:schemeClr val="tx1"/>
+              </a:solidFill>
+            </a:ln>
+          </p:spPr>
+          <p:style>
+            <a:lnRef idx="2">
+              <a:schemeClr val="accent1">
+                <a:shade val="50000"/>
+              </a:schemeClr>
+            </a:lnRef>
+            <a:fillRef idx="1">
+              <a:schemeClr val="accent1"/>
+            </a:fillRef>
+            <a:effectRef idx="0">
+              <a:schemeClr val="accent1"/>
+            </a:effectRef>
+            <a:fontRef idx="minor">
+              <a:schemeClr val="lt1"/>
+            </a:fontRef>
+          </p:style>
+          <p:txBody>
+            <a:bodyPr rtlCol="0" anchor="ctr"/>
+            <a:lstStyle/>
+            <a:p>
+              <a:pPr algn="ctr"/>
+              <a:endParaRPr lang="pt-BR">
+                <a:ln>
+                  <a:solidFill>
+                    <a:sysClr val="windowText" lastClr="000000"/>
+                  </a:solidFill>
+                </a:ln>
+                <a:solidFill>
+                  <a:sysClr val="windowText" lastClr="000000"/>
+                </a:solidFill>
+              </a:endParaRPr>
+            </a:p>
+          </p:txBody>
+        </p:sp>
+        <p:sp>
+          <p:nvSpPr>
+            <p:cNvPr id="54" name="Elipse 53"/>
+            <p:cNvSpPr/>
+            <p:nvPr/>
+          </p:nvSpPr>
+          <p:spPr>
+            <a:xfrm>
+              <a:off x="7140178" y="4045027"/>
+              <a:ext cx="108000" cy="108000"/>
+            </a:xfrm>
+            <a:prstGeom prst="ellipse">
+              <a:avLst/>
+            </a:prstGeom>
+            <a:noFill/>
+            <a:ln>
+              <a:solidFill>
+                <a:schemeClr val="tx1"/>
+              </a:solidFill>
+            </a:ln>
+          </p:spPr>
+          <p:style>
+            <a:lnRef idx="2">
+              <a:schemeClr val="accent1">
+                <a:shade val="50000"/>
+              </a:schemeClr>
+            </a:lnRef>
+            <a:fillRef idx="1">
+              <a:schemeClr val="accent1"/>
+            </a:fillRef>
+            <a:effectRef idx="0">
+              <a:schemeClr val="accent1"/>
+            </a:effectRef>
+            <a:fontRef idx="minor">
+              <a:schemeClr val="lt1"/>
+            </a:fontRef>
+          </p:style>
+          <p:txBody>
+            <a:bodyPr rtlCol="0" anchor="ctr"/>
+            <a:lstStyle/>
+            <a:p>
+              <a:pPr algn="ctr"/>
+              <a:endParaRPr lang="pt-BR">
+                <a:ln>
+                  <a:solidFill>
+                    <a:sysClr val="windowText" lastClr="000000"/>
+                  </a:solidFill>
+                </a:ln>
+                <a:solidFill>
+                  <a:sysClr val="windowText" lastClr="000000"/>
+                </a:solidFill>
+              </a:endParaRPr>
+            </a:p>
+          </p:txBody>
+        </p:sp>
+        <p:sp>
+          <p:nvSpPr>
+            <p:cNvPr id="55" name="Elipse 54"/>
+            <p:cNvSpPr/>
+            <p:nvPr/>
+          </p:nvSpPr>
+          <p:spPr>
+            <a:xfrm>
+              <a:off x="6779136" y="4045027"/>
+              <a:ext cx="108000" cy="108000"/>
+            </a:xfrm>
+            <a:prstGeom prst="ellipse">
+              <a:avLst/>
+            </a:prstGeom>
+            <a:noFill/>
+            <a:ln>
+              <a:solidFill>
+                <a:schemeClr val="tx1"/>
+              </a:solidFill>
+            </a:ln>
+          </p:spPr>
+          <p:style>
+            <a:lnRef idx="2">
+              <a:schemeClr val="accent1">
+                <a:shade val="50000"/>
+              </a:schemeClr>
+            </a:lnRef>
+            <a:fillRef idx="1">
+              <a:schemeClr val="accent1"/>
+            </a:fillRef>
+            <a:effectRef idx="0">
+              <a:schemeClr val="accent1"/>
+            </a:effectRef>
+            <a:fontRef idx="minor">
+              <a:schemeClr val="lt1"/>
+            </a:fontRef>
+          </p:style>
+          <p:txBody>
+            <a:bodyPr rtlCol="0" anchor="ctr"/>
+            <a:lstStyle/>
+            <a:p>
+              <a:pPr algn="ctr"/>
+              <a:endParaRPr lang="pt-BR">
+                <a:ln>
+                  <a:solidFill>
+                    <a:sysClr val="windowText" lastClr="000000"/>
+                  </a:solidFill>
+                </a:ln>
+                <a:solidFill>
+                  <a:sysClr val="windowText" lastClr="000000"/>
+                </a:solidFill>
+              </a:endParaRPr>
+            </a:p>
+          </p:txBody>
+        </p:sp>
+        <p:sp>
+          <p:nvSpPr>
+            <p:cNvPr id="56" name="Elipse 55"/>
+            <p:cNvSpPr/>
+            <p:nvPr/>
+          </p:nvSpPr>
+          <p:spPr>
+            <a:xfrm>
+              <a:off x="6418094" y="4045027"/>
+              <a:ext cx="108000" cy="108000"/>
+            </a:xfrm>
+            <a:prstGeom prst="ellipse">
+              <a:avLst/>
+            </a:prstGeom>
+            <a:noFill/>
+            <a:ln>
+              <a:solidFill>
+                <a:schemeClr val="tx1"/>
+              </a:solidFill>
+            </a:ln>
+          </p:spPr>
+          <p:style>
+            <a:lnRef idx="2">
+              <a:schemeClr val="accent1">
+                <a:shade val="50000"/>
+              </a:schemeClr>
+            </a:lnRef>
+            <a:fillRef idx="1">
+              <a:schemeClr val="accent1"/>
+            </a:fillRef>
+            <a:effectRef idx="0">
+              <a:schemeClr val="accent1"/>
+            </a:effectRef>
+            <a:fontRef idx="minor">
+              <a:schemeClr val="lt1"/>
+            </a:fontRef>
+          </p:style>
+          <p:txBody>
+            <a:bodyPr rtlCol="0" anchor="ctr"/>
+            <a:lstStyle/>
+            <a:p>
+              <a:pPr algn="ctr"/>
+              <a:endParaRPr lang="pt-BR">
+                <a:ln>
+                  <a:solidFill>
+                    <a:sysClr val="windowText" lastClr="000000"/>
+                  </a:solidFill>
+                </a:ln>
+                <a:solidFill>
+                  <a:sysClr val="windowText" lastClr="000000"/>
+                </a:solidFill>
+              </a:endParaRPr>
+            </a:p>
+          </p:txBody>
+        </p:sp>
+        <p:sp>
+          <p:nvSpPr>
+            <p:cNvPr id="57" name="Elipse 56"/>
+            <p:cNvSpPr/>
+            <p:nvPr/>
+          </p:nvSpPr>
+          <p:spPr>
+            <a:xfrm>
+              <a:off x="6057052" y="4045027"/>
+              <a:ext cx="108000" cy="108000"/>
+            </a:xfrm>
+            <a:prstGeom prst="ellipse">
+              <a:avLst/>
+            </a:prstGeom>
+            <a:noFill/>
+            <a:ln>
+              <a:solidFill>
+                <a:schemeClr val="tx1"/>
+              </a:solidFill>
+            </a:ln>
+          </p:spPr>
+          <p:style>
+            <a:lnRef idx="2">
+              <a:schemeClr val="accent1">
+                <a:shade val="50000"/>
+              </a:schemeClr>
+            </a:lnRef>
+            <a:fillRef idx="1">
+              <a:schemeClr val="accent1"/>
+            </a:fillRef>
+            <a:effectRef idx="0">
+              <a:schemeClr val="accent1"/>
+            </a:effectRef>
+            <a:fontRef idx="minor">
+              <a:schemeClr val="lt1"/>
+            </a:fontRef>
+          </p:style>
+          <p:txBody>
+            <a:bodyPr rtlCol="0" anchor="ctr"/>
+            <a:lstStyle/>
+            <a:p>
+              <a:pPr algn="ctr"/>
+              <a:endParaRPr lang="pt-BR">
+                <a:ln>
+                  <a:solidFill>
+                    <a:sysClr val="windowText" lastClr="000000"/>
+                  </a:solidFill>
+                </a:ln>
+                <a:solidFill>
+                  <a:sysClr val="windowText" lastClr="000000"/>
+                </a:solidFill>
+              </a:endParaRPr>
+            </a:p>
+          </p:txBody>
+        </p:sp>
+      </p:grpSp>
+      <p:grpSp>
+        <p:nvGrpSpPr>
+          <p:cNvPr id="58" name="Grupo 57"/>
+          <p:cNvGrpSpPr/>
+          <p:nvPr/>
+        </p:nvGrpSpPr>
+        <p:grpSpPr>
+          <a:xfrm>
+            <a:off x="5694367" y="3325876"/>
+            <a:ext cx="2274253" cy="108000"/>
+            <a:chOff x="5696010" y="4045027"/>
+            <a:chExt cx="2274253" cy="108000"/>
+          </a:xfrm>
+        </p:grpSpPr>
+        <p:sp>
+          <p:nvSpPr>
+            <p:cNvPr id="59" name="Elipse 58"/>
+            <p:cNvSpPr/>
+            <p:nvPr/>
+          </p:nvSpPr>
+          <p:spPr>
+            <a:xfrm>
+              <a:off x="7862263" y="4045027"/>
+              <a:ext cx="108000" cy="108000"/>
+            </a:xfrm>
+            <a:prstGeom prst="ellipse">
+              <a:avLst/>
+            </a:prstGeom>
+            <a:noFill/>
+            <a:ln>
+              <a:solidFill>
+                <a:schemeClr val="tx1"/>
+              </a:solidFill>
+            </a:ln>
+          </p:spPr>
+          <p:style>
+            <a:lnRef idx="2">
+              <a:schemeClr val="accent1">
+                <a:shade val="50000"/>
+              </a:schemeClr>
+            </a:lnRef>
+            <a:fillRef idx="1">
+              <a:schemeClr val="accent1"/>
+            </a:fillRef>
+            <a:effectRef idx="0">
+              <a:schemeClr val="accent1"/>
+            </a:effectRef>
+            <a:fontRef idx="minor">
+              <a:schemeClr val="lt1"/>
+            </a:fontRef>
+          </p:style>
+          <p:txBody>
+            <a:bodyPr rtlCol="0" anchor="ctr"/>
+            <a:lstStyle/>
+            <a:p>
+              <a:pPr algn="ctr"/>
+              <a:endParaRPr lang="pt-BR">
+                <a:ln>
+                  <a:solidFill>
+                    <a:sysClr val="windowText" lastClr="000000"/>
+                  </a:solidFill>
+                </a:ln>
+                <a:solidFill>
+                  <a:sysClr val="windowText" lastClr="000000"/>
+                </a:solidFill>
+              </a:endParaRPr>
+            </a:p>
+          </p:txBody>
+        </p:sp>
+        <p:sp>
+          <p:nvSpPr>
+            <p:cNvPr id="60" name="Elipse 59"/>
+            <p:cNvSpPr/>
+            <p:nvPr/>
+          </p:nvSpPr>
+          <p:spPr>
+            <a:xfrm>
+              <a:off x="5696010" y="4045027"/>
+              <a:ext cx="108000" cy="108000"/>
+            </a:xfrm>
+            <a:prstGeom prst="ellipse">
+              <a:avLst/>
+            </a:prstGeom>
+            <a:noFill/>
+            <a:ln>
+              <a:solidFill>
+                <a:schemeClr val="tx1"/>
+              </a:solidFill>
+            </a:ln>
+          </p:spPr>
+          <p:style>
+            <a:lnRef idx="2">
+              <a:schemeClr val="accent1">
+                <a:shade val="50000"/>
+              </a:schemeClr>
+            </a:lnRef>
+            <a:fillRef idx="1">
+              <a:schemeClr val="accent1"/>
+            </a:fillRef>
+            <a:effectRef idx="0">
+              <a:schemeClr val="accent1"/>
+            </a:effectRef>
+            <a:fontRef idx="minor">
+              <a:schemeClr val="lt1"/>
+            </a:fontRef>
+          </p:style>
+          <p:txBody>
+            <a:bodyPr rtlCol="0" anchor="ctr"/>
+            <a:lstStyle/>
+            <a:p>
+              <a:pPr algn="ctr"/>
+              <a:endParaRPr lang="pt-BR">
+                <a:ln>
+                  <a:solidFill>
+                    <a:sysClr val="windowText" lastClr="000000"/>
+                  </a:solidFill>
+                </a:ln>
+                <a:solidFill>
+                  <a:sysClr val="windowText" lastClr="000000"/>
+                </a:solidFill>
+              </a:endParaRPr>
+            </a:p>
+          </p:txBody>
+        </p:sp>
+        <p:sp>
+          <p:nvSpPr>
+            <p:cNvPr id="61" name="Elipse 60"/>
+            <p:cNvSpPr/>
+            <p:nvPr/>
+          </p:nvSpPr>
+          <p:spPr>
+            <a:xfrm>
+              <a:off x="7501220" y="4045027"/>
+              <a:ext cx="108000" cy="108000"/>
+            </a:xfrm>
+            <a:prstGeom prst="ellipse">
+              <a:avLst/>
+            </a:prstGeom>
+            <a:noFill/>
+            <a:ln>
+              <a:solidFill>
+                <a:schemeClr val="tx1"/>
+              </a:solidFill>
+            </a:ln>
+          </p:spPr>
+          <p:style>
+            <a:lnRef idx="2">
+              <a:schemeClr val="accent1">
+                <a:shade val="50000"/>
+              </a:schemeClr>
+            </a:lnRef>
+            <a:fillRef idx="1">
+              <a:schemeClr val="accent1"/>
+            </a:fillRef>
+            <a:effectRef idx="0">
+              <a:schemeClr val="accent1"/>
+            </a:effectRef>
+            <a:fontRef idx="minor">
+              <a:schemeClr val="lt1"/>
+            </a:fontRef>
+          </p:style>
+          <p:txBody>
+            <a:bodyPr rtlCol="0" anchor="ctr"/>
+            <a:lstStyle/>
+            <a:p>
+              <a:pPr algn="ctr"/>
+              <a:endParaRPr lang="pt-BR">
+                <a:ln>
+                  <a:solidFill>
+                    <a:sysClr val="windowText" lastClr="000000"/>
+                  </a:solidFill>
+                </a:ln>
+                <a:solidFill>
+                  <a:sysClr val="windowText" lastClr="000000"/>
+                </a:solidFill>
+              </a:endParaRPr>
+            </a:p>
+          </p:txBody>
+        </p:sp>
+        <p:sp>
+          <p:nvSpPr>
+            <p:cNvPr id="63" name="Elipse 62"/>
+            <p:cNvSpPr/>
+            <p:nvPr/>
+          </p:nvSpPr>
+          <p:spPr>
+            <a:xfrm>
+              <a:off x="7140178" y="4045027"/>
+              <a:ext cx="108000" cy="108000"/>
+            </a:xfrm>
+            <a:prstGeom prst="ellipse">
+              <a:avLst/>
+            </a:prstGeom>
+            <a:noFill/>
+            <a:ln>
+              <a:solidFill>
+                <a:schemeClr val="tx1"/>
+              </a:solidFill>
+            </a:ln>
+          </p:spPr>
+          <p:style>
+            <a:lnRef idx="2">
+              <a:schemeClr val="accent1">
+                <a:shade val="50000"/>
+              </a:schemeClr>
+            </a:lnRef>
+            <a:fillRef idx="1">
+              <a:schemeClr val="accent1"/>
+            </a:fillRef>
+            <a:effectRef idx="0">
+              <a:schemeClr val="accent1"/>
+            </a:effectRef>
+            <a:fontRef idx="minor">
+              <a:schemeClr val="lt1"/>
+            </a:fontRef>
+          </p:style>
+          <p:txBody>
+            <a:bodyPr rtlCol="0" anchor="ctr"/>
+            <a:lstStyle/>
+            <a:p>
+              <a:pPr algn="ctr"/>
+              <a:endParaRPr lang="pt-BR">
+                <a:ln>
+                  <a:solidFill>
+                    <a:sysClr val="windowText" lastClr="000000"/>
+                  </a:solidFill>
+                </a:ln>
+                <a:solidFill>
+                  <a:sysClr val="windowText" lastClr="000000"/>
+                </a:solidFill>
+              </a:endParaRPr>
+            </a:p>
+          </p:txBody>
+        </p:sp>
+        <p:sp>
+          <p:nvSpPr>
+            <p:cNvPr id="64" name="Elipse 63"/>
+            <p:cNvSpPr/>
+            <p:nvPr/>
+          </p:nvSpPr>
+          <p:spPr>
+            <a:xfrm>
+              <a:off x="6779136" y="4045027"/>
+              <a:ext cx="108000" cy="108000"/>
+            </a:xfrm>
+            <a:prstGeom prst="ellipse">
+              <a:avLst/>
+            </a:prstGeom>
+            <a:noFill/>
+            <a:ln>
+              <a:solidFill>
+                <a:schemeClr val="tx1"/>
+              </a:solidFill>
+            </a:ln>
+          </p:spPr>
+          <p:style>
+            <a:lnRef idx="2">
+              <a:schemeClr val="accent1">
+                <a:shade val="50000"/>
+              </a:schemeClr>
+            </a:lnRef>
+            <a:fillRef idx="1">
+              <a:schemeClr val="accent1"/>
+            </a:fillRef>
+            <a:effectRef idx="0">
+              <a:schemeClr val="accent1"/>
+            </a:effectRef>
+            <a:fontRef idx="minor">
+              <a:schemeClr val="lt1"/>
+            </a:fontRef>
+          </p:style>
+          <p:txBody>
+            <a:bodyPr rtlCol="0" anchor="ctr"/>
+            <a:lstStyle/>
+            <a:p>
+              <a:pPr algn="ctr"/>
+              <a:endParaRPr lang="pt-BR">
+                <a:ln>
+                  <a:solidFill>
+                    <a:sysClr val="windowText" lastClr="000000"/>
+                  </a:solidFill>
+                </a:ln>
+                <a:solidFill>
+                  <a:sysClr val="windowText" lastClr="000000"/>
+                </a:solidFill>
+              </a:endParaRPr>
+            </a:p>
+          </p:txBody>
+        </p:sp>
+        <p:sp>
+          <p:nvSpPr>
+            <p:cNvPr id="65" name="Elipse 64"/>
+            <p:cNvSpPr/>
+            <p:nvPr/>
+          </p:nvSpPr>
+          <p:spPr>
+            <a:xfrm>
+              <a:off x="6418094" y="4045027"/>
+              <a:ext cx="108000" cy="108000"/>
+            </a:xfrm>
+            <a:prstGeom prst="ellipse">
+              <a:avLst/>
+            </a:prstGeom>
+            <a:noFill/>
+            <a:ln>
+              <a:solidFill>
+                <a:schemeClr val="tx1"/>
+              </a:solidFill>
+            </a:ln>
+          </p:spPr>
+          <p:style>
+            <a:lnRef idx="2">
+              <a:schemeClr val="accent1">
+                <a:shade val="50000"/>
+              </a:schemeClr>
+            </a:lnRef>
+            <a:fillRef idx="1">
+              <a:schemeClr val="accent1"/>
+            </a:fillRef>
+            <a:effectRef idx="0">
+              <a:schemeClr val="accent1"/>
+            </a:effectRef>
+            <a:fontRef idx="minor">
+              <a:schemeClr val="lt1"/>
+            </a:fontRef>
+          </p:style>
+          <p:txBody>
+            <a:bodyPr rtlCol="0" anchor="ctr"/>
+            <a:lstStyle/>
+            <a:p>
+              <a:pPr algn="ctr"/>
+              <a:endParaRPr lang="pt-BR">
+                <a:ln>
+                  <a:solidFill>
+                    <a:sysClr val="windowText" lastClr="000000"/>
+                  </a:solidFill>
+                </a:ln>
+                <a:solidFill>
+                  <a:sysClr val="windowText" lastClr="000000"/>
+                </a:solidFill>
+              </a:endParaRPr>
+            </a:p>
+          </p:txBody>
+        </p:sp>
+        <p:sp>
+          <p:nvSpPr>
+            <p:cNvPr id="67" name="Elipse 66"/>
+            <p:cNvSpPr/>
+            <p:nvPr/>
+          </p:nvSpPr>
+          <p:spPr>
+            <a:xfrm>
+              <a:off x="6057052" y="4045027"/>
+              <a:ext cx="108000" cy="108000"/>
+            </a:xfrm>
+            <a:prstGeom prst="ellipse">
+              <a:avLst/>
+            </a:prstGeom>
+            <a:noFill/>
+            <a:ln>
+              <a:solidFill>
+                <a:schemeClr val="tx1"/>
+              </a:solidFill>
+            </a:ln>
+          </p:spPr>
+          <p:style>
+            <a:lnRef idx="2">
+              <a:schemeClr val="accent1">
+                <a:shade val="50000"/>
+              </a:schemeClr>
+            </a:lnRef>
+            <a:fillRef idx="1">
+              <a:schemeClr val="accent1"/>
+            </a:fillRef>
+            <a:effectRef idx="0">
+              <a:schemeClr val="accent1"/>
+            </a:effectRef>
+            <a:fontRef idx="minor">
+              <a:schemeClr val="lt1"/>
+            </a:fontRef>
+          </p:style>
+          <p:txBody>
+            <a:bodyPr rtlCol="0" anchor="ctr"/>
+            <a:lstStyle/>
+            <a:p>
+              <a:pPr algn="ctr"/>
+              <a:endParaRPr lang="pt-BR">
+                <a:ln>
+                  <a:solidFill>
+                    <a:sysClr val="windowText" lastClr="000000"/>
+                  </a:solidFill>
+                </a:ln>
+                <a:solidFill>
+                  <a:sysClr val="windowText" lastClr="000000"/>
+                </a:solidFill>
+              </a:endParaRPr>
+            </a:p>
+          </p:txBody>
+        </p:sp>
+      </p:grpSp>
+      <p:grpSp>
+        <p:nvGrpSpPr>
+          <p:cNvPr id="68" name="Grupo 67"/>
+          <p:cNvGrpSpPr/>
+          <p:nvPr/>
+        </p:nvGrpSpPr>
+        <p:grpSpPr>
+          <a:xfrm>
+            <a:off x="5694367" y="2606724"/>
+            <a:ext cx="2274253" cy="108000"/>
+            <a:chOff x="5696010" y="4045027"/>
+            <a:chExt cx="2274253" cy="108000"/>
+          </a:xfrm>
+        </p:grpSpPr>
+        <p:sp>
+          <p:nvSpPr>
+            <p:cNvPr id="69" name="Elipse 68"/>
+            <p:cNvSpPr/>
+            <p:nvPr/>
+          </p:nvSpPr>
+          <p:spPr>
+            <a:xfrm>
+              <a:off x="7862263" y="4045027"/>
+              <a:ext cx="108000" cy="108000"/>
+            </a:xfrm>
+            <a:prstGeom prst="ellipse">
+              <a:avLst/>
+            </a:prstGeom>
+            <a:noFill/>
+            <a:ln>
+              <a:solidFill>
+                <a:schemeClr val="tx1"/>
+              </a:solidFill>
+            </a:ln>
+          </p:spPr>
+          <p:style>
+            <a:lnRef idx="2">
+              <a:schemeClr val="accent1">
+                <a:shade val="50000"/>
+              </a:schemeClr>
+            </a:lnRef>
+            <a:fillRef idx="1">
+              <a:schemeClr val="accent1"/>
+            </a:fillRef>
+            <a:effectRef idx="0">
+              <a:schemeClr val="accent1"/>
+            </a:effectRef>
+            <a:fontRef idx="minor">
+              <a:schemeClr val="lt1"/>
+            </a:fontRef>
+          </p:style>
+          <p:txBody>
+            <a:bodyPr rtlCol="0" anchor="ctr"/>
+            <a:lstStyle/>
+            <a:p>
+              <a:pPr algn="ctr"/>
+              <a:endParaRPr lang="pt-BR">
+                <a:ln>
+                  <a:solidFill>
+                    <a:sysClr val="windowText" lastClr="000000"/>
+                  </a:solidFill>
+                </a:ln>
+                <a:solidFill>
+                  <a:sysClr val="windowText" lastClr="000000"/>
+                </a:solidFill>
+              </a:endParaRPr>
+            </a:p>
+          </p:txBody>
+        </p:sp>
+        <p:sp>
+          <p:nvSpPr>
+            <p:cNvPr id="70" name="Elipse 69"/>
+            <p:cNvSpPr/>
+            <p:nvPr/>
+          </p:nvSpPr>
+          <p:spPr>
+            <a:xfrm>
+              <a:off x="5696010" y="4045027"/>
+              <a:ext cx="108000" cy="108000"/>
+            </a:xfrm>
+            <a:prstGeom prst="ellipse">
+              <a:avLst/>
+            </a:prstGeom>
+            <a:noFill/>
+            <a:ln>
+              <a:solidFill>
+                <a:schemeClr val="tx1"/>
+              </a:solidFill>
+            </a:ln>
+          </p:spPr>
+          <p:style>
+            <a:lnRef idx="2">
+              <a:schemeClr val="accent1">
+                <a:shade val="50000"/>
+              </a:schemeClr>
+            </a:lnRef>
+            <a:fillRef idx="1">
+              <a:schemeClr val="accent1"/>
+            </a:fillRef>
+            <a:effectRef idx="0">
+              <a:schemeClr val="accent1"/>
+            </a:effectRef>
+            <a:fontRef idx="minor">
+              <a:schemeClr val="lt1"/>
+            </a:fontRef>
+          </p:style>
+          <p:txBody>
+            <a:bodyPr rtlCol="0" anchor="ctr"/>
+            <a:lstStyle/>
+            <a:p>
+              <a:pPr algn="ctr"/>
+              <a:endParaRPr lang="pt-BR">
+                <a:ln>
+                  <a:solidFill>
+                    <a:sysClr val="windowText" lastClr="000000"/>
+                  </a:solidFill>
+                </a:ln>
+                <a:solidFill>
+                  <a:sysClr val="windowText" lastClr="000000"/>
+                </a:solidFill>
+              </a:endParaRPr>
+            </a:p>
+          </p:txBody>
+        </p:sp>
+        <p:sp>
+          <p:nvSpPr>
+            <p:cNvPr id="71" name="Elipse 70"/>
+            <p:cNvSpPr/>
+            <p:nvPr/>
+          </p:nvSpPr>
+          <p:spPr>
+            <a:xfrm>
+              <a:off x="7501220" y="4045027"/>
+              <a:ext cx="108000" cy="108000"/>
+            </a:xfrm>
+            <a:prstGeom prst="ellipse">
+              <a:avLst/>
+            </a:prstGeom>
+            <a:noFill/>
+            <a:ln>
+              <a:solidFill>
+                <a:schemeClr val="tx1"/>
+              </a:solidFill>
+            </a:ln>
+          </p:spPr>
+          <p:style>
+            <a:lnRef idx="2">
+              <a:schemeClr val="accent1">
+                <a:shade val="50000"/>
+              </a:schemeClr>
+            </a:lnRef>
+            <a:fillRef idx="1">
+              <a:schemeClr val="accent1"/>
+            </a:fillRef>
+            <a:effectRef idx="0">
+              <a:schemeClr val="accent1"/>
+            </a:effectRef>
+            <a:fontRef idx="minor">
+              <a:schemeClr val="lt1"/>
+            </a:fontRef>
+          </p:style>
+          <p:txBody>
+            <a:bodyPr rtlCol="0" anchor="ctr"/>
+            <a:lstStyle/>
+            <a:p>
+              <a:pPr algn="ctr"/>
+              <a:endParaRPr lang="pt-BR">
+                <a:ln>
+                  <a:solidFill>
+                    <a:sysClr val="windowText" lastClr="000000"/>
+                  </a:solidFill>
+                </a:ln>
+                <a:solidFill>
+                  <a:sysClr val="windowText" lastClr="000000"/>
+                </a:solidFill>
+              </a:endParaRPr>
+            </a:p>
+          </p:txBody>
+        </p:sp>
+        <p:sp>
+          <p:nvSpPr>
+            <p:cNvPr id="72" name="Elipse 71"/>
+            <p:cNvSpPr/>
+            <p:nvPr/>
+          </p:nvSpPr>
+          <p:spPr>
+            <a:xfrm>
+              <a:off x="7140178" y="4045027"/>
+              <a:ext cx="108000" cy="108000"/>
+            </a:xfrm>
+            <a:prstGeom prst="ellipse">
+              <a:avLst/>
+            </a:prstGeom>
+            <a:noFill/>
+            <a:ln>
+              <a:solidFill>
+                <a:schemeClr val="tx1"/>
+              </a:solidFill>
+            </a:ln>
+          </p:spPr>
+          <p:style>
+            <a:lnRef idx="2">
+              <a:schemeClr val="accent1">
+                <a:shade val="50000"/>
+              </a:schemeClr>
+            </a:lnRef>
+            <a:fillRef idx="1">
+              <a:schemeClr val="accent1"/>
+            </a:fillRef>
+            <a:effectRef idx="0">
+              <a:schemeClr val="accent1"/>
+            </a:effectRef>
+            <a:fontRef idx="minor">
+              <a:schemeClr val="lt1"/>
+            </a:fontRef>
+          </p:style>
+          <p:txBody>
+            <a:bodyPr rtlCol="0" anchor="ctr"/>
+            <a:lstStyle/>
+            <a:p>
+              <a:pPr algn="ctr"/>
+              <a:endParaRPr lang="pt-BR">
+                <a:ln>
+                  <a:solidFill>
+                    <a:sysClr val="windowText" lastClr="000000"/>
+                  </a:solidFill>
+                </a:ln>
+                <a:solidFill>
+                  <a:sysClr val="windowText" lastClr="000000"/>
+                </a:solidFill>
+              </a:endParaRPr>
+            </a:p>
+          </p:txBody>
+        </p:sp>
+        <p:sp>
+          <p:nvSpPr>
+            <p:cNvPr id="73" name="Elipse 72"/>
+            <p:cNvSpPr/>
+            <p:nvPr/>
+          </p:nvSpPr>
+          <p:spPr>
+            <a:xfrm>
+              <a:off x="6779136" y="4045027"/>
+              <a:ext cx="108000" cy="108000"/>
+            </a:xfrm>
+            <a:prstGeom prst="ellipse">
+              <a:avLst/>
+            </a:prstGeom>
+            <a:noFill/>
+            <a:ln>
+              <a:solidFill>
+                <a:schemeClr val="tx1"/>
+              </a:solidFill>
+            </a:ln>
+          </p:spPr>
+          <p:style>
+            <a:lnRef idx="2">
+              <a:schemeClr val="accent1">
+                <a:shade val="50000"/>
+              </a:schemeClr>
+            </a:lnRef>
+            <a:fillRef idx="1">
+              <a:schemeClr val="accent1"/>
+            </a:fillRef>
+            <a:effectRef idx="0">
+              <a:schemeClr val="accent1"/>
+            </a:effectRef>
+            <a:fontRef idx="minor">
+              <a:schemeClr val="lt1"/>
+            </a:fontRef>
+          </p:style>
+          <p:txBody>
+            <a:bodyPr rtlCol="0" anchor="ctr"/>
+            <a:lstStyle/>
+            <a:p>
+              <a:pPr algn="ctr"/>
+              <a:endParaRPr lang="pt-BR">
+                <a:ln>
+                  <a:solidFill>
+                    <a:sysClr val="windowText" lastClr="000000"/>
+                  </a:solidFill>
+                </a:ln>
+                <a:solidFill>
+                  <a:sysClr val="windowText" lastClr="000000"/>
+                </a:solidFill>
+              </a:endParaRPr>
+            </a:p>
+          </p:txBody>
+        </p:sp>
+        <p:sp>
+          <p:nvSpPr>
+            <p:cNvPr id="74" name="Elipse 73"/>
+            <p:cNvSpPr/>
+            <p:nvPr/>
+          </p:nvSpPr>
+          <p:spPr>
+            <a:xfrm>
+              <a:off x="6418094" y="4045027"/>
+              <a:ext cx="108000" cy="108000"/>
+            </a:xfrm>
+            <a:prstGeom prst="ellipse">
+              <a:avLst/>
+            </a:prstGeom>
+            <a:noFill/>
+            <a:ln>
+              <a:solidFill>
+                <a:schemeClr val="tx1"/>
+              </a:solidFill>
+            </a:ln>
+          </p:spPr>
+          <p:style>
+            <a:lnRef idx="2">
+              <a:schemeClr val="accent1">
+                <a:shade val="50000"/>
+              </a:schemeClr>
+            </a:lnRef>
+            <a:fillRef idx="1">
+              <a:schemeClr val="accent1"/>
+            </a:fillRef>
+            <a:effectRef idx="0">
+              <a:schemeClr val="accent1"/>
+            </a:effectRef>
+            <a:fontRef idx="minor">
+              <a:schemeClr val="lt1"/>
+            </a:fontRef>
+          </p:style>
+          <p:txBody>
+            <a:bodyPr rtlCol="0" anchor="ctr"/>
+            <a:lstStyle/>
+            <a:p>
+              <a:pPr algn="ctr"/>
+              <a:endParaRPr lang="pt-BR">
+                <a:ln>
+                  <a:solidFill>
+                    <a:sysClr val="windowText" lastClr="000000"/>
+                  </a:solidFill>
+                </a:ln>
+                <a:solidFill>
+                  <a:sysClr val="windowText" lastClr="000000"/>
+                </a:solidFill>
+              </a:endParaRPr>
+            </a:p>
+          </p:txBody>
+        </p:sp>
+        <p:sp>
+          <p:nvSpPr>
+            <p:cNvPr id="75" name="Elipse 74"/>
+            <p:cNvSpPr/>
+            <p:nvPr/>
+          </p:nvSpPr>
+          <p:spPr>
+            <a:xfrm>
+              <a:off x="6057052" y="4045027"/>
+              <a:ext cx="108000" cy="108000"/>
+            </a:xfrm>
+            <a:prstGeom prst="ellipse">
+              <a:avLst/>
+            </a:prstGeom>
+            <a:noFill/>
+            <a:ln>
+              <a:solidFill>
+                <a:schemeClr val="tx1"/>
+              </a:solidFill>
+            </a:ln>
+          </p:spPr>
+          <p:style>
+            <a:lnRef idx="2">
+              <a:schemeClr val="accent1">
+                <a:shade val="50000"/>
+              </a:schemeClr>
+            </a:lnRef>
+            <a:fillRef idx="1">
+              <a:schemeClr val="accent1"/>
+            </a:fillRef>
+            <a:effectRef idx="0">
+              <a:schemeClr val="accent1"/>
+            </a:effectRef>
+            <a:fontRef idx="minor">
+              <a:schemeClr val="lt1"/>
+            </a:fontRef>
+          </p:style>
+          <p:txBody>
+            <a:bodyPr rtlCol="0" anchor="ctr"/>
+            <a:lstStyle/>
+            <a:p>
+              <a:pPr algn="ctr"/>
+              <a:endParaRPr lang="pt-BR">
+                <a:ln>
+                  <a:solidFill>
+                    <a:sysClr val="windowText" lastClr="000000"/>
+                  </a:solidFill>
+                </a:ln>
+                <a:solidFill>
+                  <a:sysClr val="windowText" lastClr="000000"/>
+                </a:solidFill>
+              </a:endParaRPr>
+            </a:p>
+          </p:txBody>
+        </p:sp>
+      </p:grpSp>
+      <p:grpSp>
+        <p:nvGrpSpPr>
+          <p:cNvPr id="77" name="Grupo 76"/>
+          <p:cNvGrpSpPr/>
+          <p:nvPr/>
+        </p:nvGrpSpPr>
+        <p:grpSpPr>
+          <a:xfrm>
+            <a:off x="5694367" y="2247148"/>
+            <a:ext cx="2274253" cy="108000"/>
+            <a:chOff x="5696010" y="4045027"/>
+            <a:chExt cx="2274253" cy="108000"/>
+          </a:xfrm>
+        </p:grpSpPr>
+        <p:sp>
+          <p:nvSpPr>
+            <p:cNvPr id="78" name="Elipse 77"/>
+            <p:cNvSpPr/>
+            <p:nvPr/>
+          </p:nvSpPr>
+          <p:spPr>
+            <a:xfrm>
+              <a:off x="7862263" y="4045027"/>
+              <a:ext cx="108000" cy="108000"/>
+            </a:xfrm>
+            <a:prstGeom prst="ellipse">
+              <a:avLst/>
+            </a:prstGeom>
+            <a:noFill/>
+            <a:ln>
+              <a:solidFill>
+                <a:schemeClr val="tx1"/>
+              </a:solidFill>
+            </a:ln>
+          </p:spPr>
+          <p:style>
+            <a:lnRef idx="2">
+              <a:schemeClr val="accent1">
+                <a:shade val="50000"/>
+              </a:schemeClr>
+            </a:lnRef>
+            <a:fillRef idx="1">
+              <a:schemeClr val="accent1"/>
+            </a:fillRef>
+            <a:effectRef idx="0">
+              <a:schemeClr val="accent1"/>
+            </a:effectRef>
+            <a:fontRef idx="minor">
+              <a:schemeClr val="lt1"/>
+            </a:fontRef>
+          </p:style>
+          <p:txBody>
+            <a:bodyPr rtlCol="0" anchor="ctr"/>
+            <a:lstStyle/>
+            <a:p>
+              <a:pPr algn="ctr"/>
+              <a:endParaRPr lang="pt-BR">
+                <a:ln>
+                  <a:solidFill>
+                    <a:sysClr val="windowText" lastClr="000000"/>
+                  </a:solidFill>
+                </a:ln>
+                <a:solidFill>
+                  <a:sysClr val="windowText" lastClr="000000"/>
+                </a:solidFill>
+              </a:endParaRPr>
+            </a:p>
+          </p:txBody>
+        </p:sp>
+        <p:sp>
+          <p:nvSpPr>
+            <p:cNvPr id="79" name="Elipse 78"/>
+            <p:cNvSpPr/>
+            <p:nvPr/>
+          </p:nvSpPr>
+          <p:spPr>
+            <a:xfrm>
+              <a:off x="5696010" y="4045027"/>
+              <a:ext cx="108000" cy="108000"/>
+            </a:xfrm>
+            <a:prstGeom prst="ellipse">
+              <a:avLst/>
+            </a:prstGeom>
+            <a:noFill/>
+            <a:ln>
+              <a:solidFill>
+                <a:schemeClr val="tx1"/>
+              </a:solidFill>
+            </a:ln>
+          </p:spPr>
+          <p:style>
+            <a:lnRef idx="2">
+              <a:schemeClr val="accent1">
+                <a:shade val="50000"/>
+              </a:schemeClr>
+            </a:lnRef>
+            <a:fillRef idx="1">
+              <a:schemeClr val="accent1"/>
+            </a:fillRef>
+            <a:effectRef idx="0">
+              <a:schemeClr val="accent1"/>
+            </a:effectRef>
+            <a:fontRef idx="minor">
+              <a:schemeClr val="lt1"/>
+            </a:fontRef>
+          </p:style>
+          <p:txBody>
+            <a:bodyPr rtlCol="0" anchor="ctr"/>
+            <a:lstStyle/>
+            <a:p>
+              <a:pPr algn="ctr"/>
+              <a:endParaRPr lang="pt-BR">
+                <a:ln>
+                  <a:solidFill>
+                    <a:sysClr val="windowText" lastClr="000000"/>
+                  </a:solidFill>
+                </a:ln>
+                <a:solidFill>
+                  <a:sysClr val="windowText" lastClr="000000"/>
+                </a:solidFill>
+              </a:endParaRPr>
+            </a:p>
+          </p:txBody>
+        </p:sp>
+        <p:sp>
+          <p:nvSpPr>
+            <p:cNvPr id="80" name="Elipse 79"/>
+            <p:cNvSpPr/>
+            <p:nvPr/>
+          </p:nvSpPr>
+          <p:spPr>
+            <a:xfrm>
+              <a:off x="7501220" y="4045027"/>
+              <a:ext cx="108000" cy="108000"/>
+            </a:xfrm>
+            <a:prstGeom prst="ellipse">
+              <a:avLst/>
+            </a:prstGeom>
+            <a:noFill/>
+            <a:ln>
+              <a:solidFill>
+                <a:schemeClr val="tx1"/>
+              </a:solidFill>
+            </a:ln>
+          </p:spPr>
+          <p:style>
+            <a:lnRef idx="2">
+              <a:schemeClr val="accent1">
+                <a:shade val="50000"/>
+              </a:schemeClr>
+            </a:lnRef>
+            <a:fillRef idx="1">
+              <a:schemeClr val="accent1"/>
+            </a:fillRef>
+            <a:effectRef idx="0">
+              <a:schemeClr val="accent1"/>
+            </a:effectRef>
+            <a:fontRef idx="minor">
+              <a:schemeClr val="lt1"/>
+            </a:fontRef>
+          </p:style>
+          <p:txBody>
+            <a:bodyPr rtlCol="0" anchor="ctr"/>
+            <a:lstStyle/>
+            <a:p>
+              <a:pPr algn="ctr"/>
+              <a:endParaRPr lang="pt-BR">
+                <a:ln>
+                  <a:solidFill>
+                    <a:sysClr val="windowText" lastClr="000000"/>
+                  </a:solidFill>
+                </a:ln>
+                <a:solidFill>
+                  <a:sysClr val="windowText" lastClr="000000"/>
+                </a:solidFill>
+              </a:endParaRPr>
+            </a:p>
+          </p:txBody>
+        </p:sp>
+        <p:sp>
+          <p:nvSpPr>
+            <p:cNvPr id="81" name="Elipse 80"/>
+            <p:cNvSpPr/>
+            <p:nvPr/>
+          </p:nvSpPr>
+          <p:spPr>
+            <a:xfrm>
+              <a:off x="7140178" y="4045027"/>
+              <a:ext cx="108000" cy="108000"/>
+            </a:xfrm>
+            <a:prstGeom prst="ellipse">
+              <a:avLst/>
+            </a:prstGeom>
+            <a:noFill/>
+            <a:ln>
+              <a:solidFill>
+                <a:schemeClr val="tx1"/>
+              </a:solidFill>
+            </a:ln>
+          </p:spPr>
+          <p:style>
+            <a:lnRef idx="2">
+              <a:schemeClr val="accent1">
+                <a:shade val="50000"/>
+              </a:schemeClr>
+            </a:lnRef>
+            <a:fillRef idx="1">
+              <a:schemeClr val="accent1"/>
+            </a:fillRef>
+            <a:effectRef idx="0">
+              <a:schemeClr val="accent1"/>
+            </a:effectRef>
+            <a:fontRef idx="minor">
+              <a:schemeClr val="lt1"/>
+            </a:fontRef>
+          </p:style>
+          <p:txBody>
+            <a:bodyPr rtlCol="0" anchor="ctr"/>
+            <a:lstStyle/>
+            <a:p>
+              <a:pPr algn="ctr"/>
+              <a:endParaRPr lang="pt-BR">
+                <a:ln>
+                  <a:solidFill>
+                    <a:sysClr val="windowText" lastClr="000000"/>
+                  </a:solidFill>
+                </a:ln>
+                <a:solidFill>
+                  <a:sysClr val="windowText" lastClr="000000"/>
+                </a:solidFill>
+              </a:endParaRPr>
+            </a:p>
+          </p:txBody>
+        </p:sp>
+        <p:sp>
+          <p:nvSpPr>
+            <p:cNvPr id="82" name="Elipse 81"/>
+            <p:cNvSpPr/>
+            <p:nvPr/>
+          </p:nvSpPr>
+          <p:spPr>
+            <a:xfrm>
+              <a:off x="6779136" y="4045027"/>
+              <a:ext cx="108000" cy="108000"/>
+            </a:xfrm>
+            <a:prstGeom prst="ellipse">
+              <a:avLst/>
+            </a:prstGeom>
+            <a:noFill/>
+            <a:ln>
+              <a:solidFill>
+                <a:schemeClr val="tx1"/>
+              </a:solidFill>
+            </a:ln>
+          </p:spPr>
+          <p:style>
+            <a:lnRef idx="2">
+              <a:schemeClr val="accent1">
+                <a:shade val="50000"/>
+              </a:schemeClr>
+            </a:lnRef>
+            <a:fillRef idx="1">
+              <a:schemeClr val="accent1"/>
+            </a:fillRef>
+            <a:effectRef idx="0">
+              <a:schemeClr val="accent1"/>
+            </a:effectRef>
+            <a:fontRef idx="minor">
+              <a:schemeClr val="lt1"/>
+            </a:fontRef>
+          </p:style>
+          <p:txBody>
+            <a:bodyPr rtlCol="0" anchor="ctr"/>
+            <a:lstStyle/>
+            <a:p>
+              <a:pPr algn="ctr"/>
+              <a:endParaRPr lang="pt-BR">
+                <a:ln>
+                  <a:solidFill>
+                    <a:sysClr val="windowText" lastClr="000000"/>
+                  </a:solidFill>
+                </a:ln>
+                <a:solidFill>
+                  <a:sysClr val="windowText" lastClr="000000"/>
+                </a:solidFill>
+              </a:endParaRPr>
+            </a:p>
+          </p:txBody>
+        </p:sp>
+        <p:sp>
+          <p:nvSpPr>
+            <p:cNvPr id="83" name="Elipse 82"/>
+            <p:cNvSpPr/>
+            <p:nvPr/>
+          </p:nvSpPr>
+          <p:spPr>
+            <a:xfrm>
+              <a:off x="6418094" y="4045027"/>
+              <a:ext cx="108000" cy="108000"/>
+            </a:xfrm>
+            <a:prstGeom prst="ellipse">
+              <a:avLst/>
+            </a:prstGeom>
+            <a:noFill/>
+            <a:ln>
+              <a:solidFill>
+                <a:schemeClr val="tx1"/>
+              </a:solidFill>
+            </a:ln>
+          </p:spPr>
+          <p:style>
+            <a:lnRef idx="2">
+              <a:schemeClr val="accent1">
+                <a:shade val="50000"/>
+              </a:schemeClr>
+            </a:lnRef>
+            <a:fillRef idx="1">
+              <a:schemeClr val="accent1"/>
+            </a:fillRef>
+            <a:effectRef idx="0">
+              <a:schemeClr val="accent1"/>
+            </a:effectRef>
+            <a:fontRef idx="minor">
+              <a:schemeClr val="lt1"/>
+            </a:fontRef>
+          </p:style>
+          <p:txBody>
+            <a:bodyPr rtlCol="0" anchor="ctr"/>
+            <a:lstStyle/>
+            <a:p>
+              <a:pPr algn="ctr"/>
+              <a:endParaRPr lang="pt-BR">
+                <a:ln>
+                  <a:solidFill>
+                    <a:sysClr val="windowText" lastClr="000000"/>
+                  </a:solidFill>
+                </a:ln>
+                <a:solidFill>
+                  <a:sysClr val="windowText" lastClr="000000"/>
+                </a:solidFill>
+              </a:endParaRPr>
+            </a:p>
+          </p:txBody>
+        </p:sp>
+        <p:sp>
+          <p:nvSpPr>
+            <p:cNvPr id="84" name="Elipse 83"/>
+            <p:cNvSpPr/>
+            <p:nvPr/>
+          </p:nvSpPr>
+          <p:spPr>
+            <a:xfrm>
+              <a:off x="6057052" y="4045027"/>
+              <a:ext cx="108000" cy="108000"/>
+            </a:xfrm>
+            <a:prstGeom prst="ellipse">
+              <a:avLst/>
+            </a:prstGeom>
+            <a:noFill/>
+            <a:ln>
+              <a:solidFill>
+                <a:schemeClr val="tx1"/>
+              </a:solidFill>
+            </a:ln>
+          </p:spPr>
+          <p:style>
+            <a:lnRef idx="2">
+              <a:schemeClr val="accent1">
+                <a:shade val="50000"/>
+              </a:schemeClr>
+            </a:lnRef>
+            <a:fillRef idx="1">
+              <a:schemeClr val="accent1"/>
+            </a:fillRef>
+            <a:effectRef idx="0">
+              <a:schemeClr val="accent1"/>
+            </a:effectRef>
+            <a:fontRef idx="minor">
+              <a:schemeClr val="lt1"/>
+            </a:fontRef>
+          </p:style>
+          <p:txBody>
+            <a:bodyPr rtlCol="0" anchor="ctr"/>
+            <a:lstStyle/>
+            <a:p>
+              <a:pPr algn="ctr"/>
+              <a:endParaRPr lang="pt-BR">
+                <a:ln>
+                  <a:solidFill>
+                    <a:sysClr val="windowText" lastClr="000000"/>
+                  </a:solidFill>
+                </a:ln>
+                <a:solidFill>
+                  <a:sysClr val="windowText" lastClr="000000"/>
+                </a:solidFill>
+              </a:endParaRPr>
+            </a:p>
+          </p:txBody>
+        </p:sp>
+      </p:grpSp>
+      <p:grpSp>
+        <p:nvGrpSpPr>
+          <p:cNvPr id="85" name="Grupo 84"/>
+          <p:cNvGrpSpPr/>
+          <p:nvPr/>
+        </p:nvGrpSpPr>
+        <p:grpSpPr>
+          <a:xfrm>
+            <a:off x="5694367" y="2966300"/>
+            <a:ext cx="2274253" cy="108000"/>
+            <a:chOff x="5696010" y="4045027"/>
+            <a:chExt cx="2274253" cy="108000"/>
+          </a:xfrm>
+        </p:grpSpPr>
+        <p:sp>
+          <p:nvSpPr>
+            <p:cNvPr id="86" name="Elipse 85"/>
+            <p:cNvSpPr/>
+            <p:nvPr/>
+          </p:nvSpPr>
+          <p:spPr>
+            <a:xfrm>
+              <a:off x="7862263" y="4045027"/>
+              <a:ext cx="108000" cy="108000"/>
+            </a:xfrm>
+            <a:prstGeom prst="ellipse">
+              <a:avLst/>
+            </a:prstGeom>
+            <a:noFill/>
+            <a:ln>
+              <a:solidFill>
+                <a:schemeClr val="tx1"/>
+              </a:solidFill>
+            </a:ln>
+          </p:spPr>
+          <p:style>
+            <a:lnRef idx="2">
+              <a:schemeClr val="accent1">
+                <a:shade val="50000"/>
+              </a:schemeClr>
+            </a:lnRef>
+            <a:fillRef idx="1">
+              <a:schemeClr val="accent1"/>
+            </a:fillRef>
+            <a:effectRef idx="0">
+              <a:schemeClr val="accent1"/>
+            </a:effectRef>
+            <a:fontRef idx="minor">
+              <a:schemeClr val="lt1"/>
+            </a:fontRef>
+          </p:style>
+          <p:txBody>
+            <a:bodyPr rtlCol="0" anchor="ctr"/>
+            <a:lstStyle/>
+            <a:p>
+              <a:pPr algn="ctr"/>
+              <a:endParaRPr lang="pt-BR">
+                <a:ln>
+                  <a:solidFill>
+                    <a:sysClr val="windowText" lastClr="000000"/>
+                  </a:solidFill>
+                </a:ln>
+                <a:solidFill>
+                  <a:sysClr val="windowText" lastClr="000000"/>
+                </a:solidFill>
+              </a:endParaRPr>
+            </a:p>
+          </p:txBody>
+        </p:sp>
+        <p:sp>
+          <p:nvSpPr>
+            <p:cNvPr id="87" name="Elipse 86"/>
+            <p:cNvSpPr/>
+            <p:nvPr/>
+          </p:nvSpPr>
+          <p:spPr>
+            <a:xfrm>
+              <a:off x="5696010" y="4045027"/>
+              <a:ext cx="108000" cy="108000"/>
+            </a:xfrm>
+            <a:prstGeom prst="ellipse">
+              <a:avLst/>
+            </a:prstGeom>
+            <a:noFill/>
+            <a:ln>
+              <a:solidFill>
+                <a:schemeClr val="tx1"/>
+              </a:solidFill>
+            </a:ln>
+          </p:spPr>
+          <p:style>
+            <a:lnRef idx="2">
+              <a:schemeClr val="accent1">
+                <a:shade val="50000"/>
+              </a:schemeClr>
+            </a:lnRef>
+            <a:fillRef idx="1">
+              <a:schemeClr val="accent1"/>
+            </a:fillRef>
+            <a:effectRef idx="0">
+              <a:schemeClr val="accent1"/>
+            </a:effectRef>
+            <a:fontRef idx="minor">
+              <a:schemeClr val="lt1"/>
+            </a:fontRef>
+          </p:style>
+          <p:txBody>
+            <a:bodyPr rtlCol="0" anchor="ctr"/>
+            <a:lstStyle/>
+            <a:p>
+              <a:pPr algn="ctr"/>
+              <a:endParaRPr lang="pt-BR">
+                <a:ln>
+                  <a:solidFill>
+                    <a:sysClr val="windowText" lastClr="000000"/>
+                  </a:solidFill>
+                </a:ln>
+                <a:solidFill>
+                  <a:sysClr val="windowText" lastClr="000000"/>
+                </a:solidFill>
+              </a:endParaRPr>
+            </a:p>
+          </p:txBody>
+        </p:sp>
+        <p:sp>
+          <p:nvSpPr>
+            <p:cNvPr id="88" name="Elipse 87"/>
+            <p:cNvSpPr/>
+            <p:nvPr/>
+          </p:nvSpPr>
+          <p:spPr>
+            <a:xfrm>
+              <a:off x="7501220" y="4045027"/>
+              <a:ext cx="108000" cy="108000"/>
+            </a:xfrm>
+            <a:prstGeom prst="ellipse">
+              <a:avLst/>
+            </a:prstGeom>
+            <a:noFill/>
+            <a:ln>
+              <a:solidFill>
+                <a:schemeClr val="tx1"/>
+              </a:solidFill>
+            </a:ln>
+          </p:spPr>
+          <p:style>
+            <a:lnRef idx="2">
+              <a:schemeClr val="accent1">
+                <a:shade val="50000"/>
+              </a:schemeClr>
+            </a:lnRef>
+            <a:fillRef idx="1">
+              <a:schemeClr val="accent1"/>
+            </a:fillRef>
+            <a:effectRef idx="0">
+              <a:schemeClr val="accent1"/>
+            </a:effectRef>
+            <a:fontRef idx="minor">
+              <a:schemeClr val="lt1"/>
+            </a:fontRef>
+          </p:style>
+          <p:txBody>
+            <a:bodyPr rtlCol="0" anchor="ctr"/>
+            <a:lstStyle/>
+            <a:p>
+              <a:pPr algn="ctr"/>
+              <a:endParaRPr lang="pt-BR">
+                <a:ln>
+                  <a:solidFill>
+                    <a:sysClr val="windowText" lastClr="000000"/>
+                  </a:solidFill>
+                </a:ln>
+                <a:solidFill>
+                  <a:sysClr val="windowText" lastClr="000000"/>
+                </a:solidFill>
+              </a:endParaRPr>
+            </a:p>
+          </p:txBody>
+        </p:sp>
+        <p:sp>
+          <p:nvSpPr>
+            <p:cNvPr id="89" name="Elipse 88"/>
+            <p:cNvSpPr/>
+            <p:nvPr/>
+          </p:nvSpPr>
+          <p:spPr>
+            <a:xfrm>
+              <a:off x="7140178" y="4045027"/>
+              <a:ext cx="108000" cy="108000"/>
+            </a:xfrm>
+            <a:prstGeom prst="ellipse">
+              <a:avLst/>
+            </a:prstGeom>
+            <a:noFill/>
+            <a:ln>
+              <a:solidFill>
+                <a:schemeClr val="tx1"/>
+              </a:solidFill>
+            </a:ln>
+          </p:spPr>
+          <p:style>
+            <a:lnRef idx="2">
+              <a:schemeClr val="accent1">
+                <a:shade val="50000"/>
+              </a:schemeClr>
+            </a:lnRef>
+            <a:fillRef idx="1">
+              <a:schemeClr val="accent1"/>
+            </a:fillRef>
+            <a:effectRef idx="0">
+              <a:schemeClr val="accent1"/>
+            </a:effectRef>
+            <a:fontRef idx="minor">
+              <a:schemeClr val="lt1"/>
+            </a:fontRef>
+          </p:style>
+          <p:txBody>
+            <a:bodyPr rtlCol="0" anchor="ctr"/>
+            <a:lstStyle/>
+            <a:p>
+              <a:pPr algn="ctr"/>
+              <a:endParaRPr lang="pt-BR">
+                <a:ln>
+                  <a:solidFill>
+                    <a:sysClr val="windowText" lastClr="000000"/>
+                  </a:solidFill>
+                </a:ln>
+                <a:solidFill>
+                  <a:sysClr val="windowText" lastClr="000000"/>
+                </a:solidFill>
+              </a:endParaRPr>
+            </a:p>
+          </p:txBody>
+        </p:sp>
+        <p:sp>
+          <p:nvSpPr>
+            <p:cNvPr id="91" name="Elipse 90"/>
+            <p:cNvSpPr/>
+            <p:nvPr/>
+          </p:nvSpPr>
+          <p:spPr>
+            <a:xfrm>
+              <a:off x="6418094" y="4045027"/>
+              <a:ext cx="108000" cy="108000"/>
+            </a:xfrm>
+            <a:prstGeom prst="ellipse">
+              <a:avLst/>
+            </a:prstGeom>
+            <a:noFill/>
+            <a:ln>
+              <a:solidFill>
+                <a:schemeClr val="tx1"/>
+              </a:solidFill>
+            </a:ln>
+          </p:spPr>
+          <p:style>
+            <a:lnRef idx="2">
+              <a:schemeClr val="accent1">
+                <a:shade val="50000"/>
+              </a:schemeClr>
+            </a:lnRef>
+            <a:fillRef idx="1">
+              <a:schemeClr val="accent1"/>
+            </a:fillRef>
+            <a:effectRef idx="0">
+              <a:schemeClr val="accent1"/>
+            </a:effectRef>
+            <a:fontRef idx="minor">
+              <a:schemeClr val="lt1"/>
+            </a:fontRef>
+          </p:style>
+          <p:txBody>
+            <a:bodyPr rtlCol="0" anchor="ctr"/>
+            <a:lstStyle/>
+            <a:p>
+              <a:pPr algn="ctr"/>
+              <a:endParaRPr lang="pt-BR">
+                <a:ln>
+                  <a:solidFill>
+                    <a:sysClr val="windowText" lastClr="000000"/>
+                  </a:solidFill>
+                </a:ln>
+                <a:solidFill>
+                  <a:sysClr val="windowText" lastClr="000000"/>
+                </a:solidFill>
+              </a:endParaRPr>
+            </a:p>
+          </p:txBody>
+        </p:sp>
+        <p:sp>
+          <p:nvSpPr>
+            <p:cNvPr id="92" name="Elipse 91"/>
+            <p:cNvSpPr/>
+            <p:nvPr/>
+          </p:nvSpPr>
+          <p:spPr>
+            <a:xfrm>
+              <a:off x="6057052" y="4045027"/>
+              <a:ext cx="108000" cy="108000"/>
+            </a:xfrm>
+            <a:prstGeom prst="ellipse">
+              <a:avLst/>
+            </a:prstGeom>
+            <a:noFill/>
+            <a:ln>
+              <a:solidFill>
+                <a:schemeClr val="tx1"/>
+              </a:solidFill>
+            </a:ln>
+          </p:spPr>
+          <p:style>
+            <a:lnRef idx="2">
+              <a:schemeClr val="accent1">
+                <a:shade val="50000"/>
+              </a:schemeClr>
+            </a:lnRef>
+            <a:fillRef idx="1">
+              <a:schemeClr val="accent1"/>
+            </a:fillRef>
+            <a:effectRef idx="0">
+              <a:schemeClr val="accent1"/>
+            </a:effectRef>
+            <a:fontRef idx="minor">
+              <a:schemeClr val="lt1"/>
+            </a:fontRef>
+          </p:style>
+          <p:txBody>
+            <a:bodyPr rtlCol="0" anchor="ctr"/>
+            <a:lstStyle/>
+            <a:p>
+              <a:pPr algn="ctr"/>
+              <a:endParaRPr lang="pt-BR">
+                <a:ln>
+                  <a:solidFill>
+                    <a:sysClr val="windowText" lastClr="000000"/>
+                  </a:solidFill>
+                </a:ln>
+                <a:solidFill>
+                  <a:sysClr val="windowText" lastClr="000000"/>
+                </a:solidFill>
+              </a:endParaRPr>
+            </a:p>
+          </p:txBody>
+        </p:sp>
+      </p:grpSp>
     </p:spTree>
     <p:extLst>
       <p:ext uri="{BB962C8B-B14F-4D97-AF65-F5344CB8AC3E}">

</xml_diff>

<commit_message>
improve the decription of the discretization
</commit_message>
<xml_diff>
--- a/manuscript/Figs/Aspectos_geometricos.pptx
+++ b/manuscript/Figs/Aspectos_geometricos.pptx
@@ -203,7 +203,7 @@
           <a:p>
             <a:fld id="{A72D0A6C-9BA5-4E32-9F58-11F27415CF1A}" type="datetimeFigureOut">
               <a:rPr lang="pt-BR" smtClean="0"/>
-              <a:t>15/06/2016</a:t>
+              <a:t>17/06/2016</a:t>
             </a:fld>
             <a:endParaRPr lang="pt-BR"/>
           </a:p>
@@ -1465,7 +1465,7 @@
           <a:p>
             <a:fld id="{59E0689A-8B4C-40D5-AF15-5E1194025FEE}" type="datetimeFigureOut">
               <a:rPr lang="pt-BR" smtClean="0"/>
-              <a:t>15/06/2016</a:t>
+              <a:t>17/06/2016</a:t>
             </a:fld>
             <a:endParaRPr lang="pt-BR"/>
           </a:p>
@@ -1635,7 +1635,7 @@
           <a:p>
             <a:fld id="{59E0689A-8B4C-40D5-AF15-5E1194025FEE}" type="datetimeFigureOut">
               <a:rPr lang="pt-BR" smtClean="0"/>
-              <a:t>15/06/2016</a:t>
+              <a:t>17/06/2016</a:t>
             </a:fld>
             <a:endParaRPr lang="pt-BR"/>
           </a:p>
@@ -1815,7 +1815,7 @@
           <a:p>
             <a:fld id="{59E0689A-8B4C-40D5-AF15-5E1194025FEE}" type="datetimeFigureOut">
               <a:rPr lang="pt-BR" smtClean="0"/>
-              <a:t>15/06/2016</a:t>
+              <a:t>17/06/2016</a:t>
             </a:fld>
             <a:endParaRPr lang="pt-BR"/>
           </a:p>
@@ -1985,7 +1985,7 @@
           <a:p>
             <a:fld id="{59E0689A-8B4C-40D5-AF15-5E1194025FEE}" type="datetimeFigureOut">
               <a:rPr lang="pt-BR" smtClean="0"/>
-              <a:t>15/06/2016</a:t>
+              <a:t>17/06/2016</a:t>
             </a:fld>
             <a:endParaRPr lang="pt-BR"/>
           </a:p>
@@ -2231,7 +2231,7 @@
           <a:p>
             <a:fld id="{59E0689A-8B4C-40D5-AF15-5E1194025FEE}" type="datetimeFigureOut">
               <a:rPr lang="pt-BR" smtClean="0"/>
-              <a:t>15/06/2016</a:t>
+              <a:t>17/06/2016</a:t>
             </a:fld>
             <a:endParaRPr lang="pt-BR"/>
           </a:p>
@@ -2519,7 +2519,7 @@
           <a:p>
             <a:fld id="{59E0689A-8B4C-40D5-AF15-5E1194025FEE}" type="datetimeFigureOut">
               <a:rPr lang="pt-BR" smtClean="0"/>
-              <a:t>15/06/2016</a:t>
+              <a:t>17/06/2016</a:t>
             </a:fld>
             <a:endParaRPr lang="pt-BR"/>
           </a:p>
@@ -2941,7 +2941,7 @@
           <a:p>
             <a:fld id="{59E0689A-8B4C-40D5-AF15-5E1194025FEE}" type="datetimeFigureOut">
               <a:rPr lang="pt-BR" smtClean="0"/>
-              <a:t>15/06/2016</a:t>
+              <a:t>17/06/2016</a:t>
             </a:fld>
             <a:endParaRPr lang="pt-BR"/>
           </a:p>
@@ -3059,7 +3059,7 @@
           <a:p>
             <a:fld id="{59E0689A-8B4C-40D5-AF15-5E1194025FEE}" type="datetimeFigureOut">
               <a:rPr lang="pt-BR" smtClean="0"/>
-              <a:t>15/06/2016</a:t>
+              <a:t>17/06/2016</a:t>
             </a:fld>
             <a:endParaRPr lang="pt-BR"/>
           </a:p>
@@ -3154,7 +3154,7 @@
           <a:p>
             <a:fld id="{59E0689A-8B4C-40D5-AF15-5E1194025FEE}" type="datetimeFigureOut">
               <a:rPr lang="pt-BR" smtClean="0"/>
-              <a:t>15/06/2016</a:t>
+              <a:t>17/06/2016</a:t>
             </a:fld>
             <a:endParaRPr lang="pt-BR"/>
           </a:p>
@@ -3431,7 +3431,7 @@
           <a:p>
             <a:fld id="{59E0689A-8B4C-40D5-AF15-5E1194025FEE}" type="datetimeFigureOut">
               <a:rPr lang="pt-BR" smtClean="0"/>
-              <a:t>15/06/2016</a:t>
+              <a:t>17/06/2016</a:t>
             </a:fld>
             <a:endParaRPr lang="pt-BR"/>
           </a:p>
@@ -3684,7 +3684,7 @@
           <a:p>
             <a:fld id="{59E0689A-8B4C-40D5-AF15-5E1194025FEE}" type="datetimeFigureOut">
               <a:rPr lang="pt-BR" smtClean="0"/>
-              <a:t>15/06/2016</a:t>
+              <a:t>17/06/2016</a:t>
             </a:fld>
             <a:endParaRPr lang="pt-BR"/>
           </a:p>
@@ -3897,7 +3897,7 @@
           <a:p>
             <a:fld id="{59E0689A-8B4C-40D5-AF15-5E1194025FEE}" type="datetimeFigureOut">
               <a:rPr lang="pt-BR" smtClean="0"/>
-              <a:t>15/06/2016</a:t>
+              <a:t>17/06/2016</a:t>
             </a:fld>
             <a:endParaRPr lang="pt-BR"/>
           </a:p>
@@ -11856,6 +11856,216 @@
           </p:txBody>
         </p:sp>
       </p:grpSp>
+      <p:cxnSp>
+        <p:nvCxnSpPr>
+          <p:cNvPr id="90" name="Conector reto 89"/>
+          <p:cNvCxnSpPr/>
+          <p:nvPr/>
+        </p:nvCxnSpPr>
+        <p:spPr>
+          <a:xfrm>
+            <a:off x="2363597" y="3308057"/>
+            <a:ext cx="0" cy="378000"/>
+          </a:xfrm>
+          <a:prstGeom prst="line">
+            <a:avLst/>
+          </a:prstGeom>
+          <a:ln w="38100">
+            <a:solidFill>
+              <a:schemeClr val="tx1"/>
+            </a:solidFill>
+          </a:ln>
+        </p:spPr>
+        <p:style>
+          <a:lnRef idx="1">
+            <a:schemeClr val="accent1"/>
+          </a:lnRef>
+          <a:fillRef idx="0">
+            <a:schemeClr val="accent1"/>
+          </a:fillRef>
+          <a:effectRef idx="0">
+            <a:schemeClr val="accent1"/>
+          </a:effectRef>
+          <a:fontRef idx="minor">
+            <a:schemeClr val="tx1"/>
+          </a:fontRef>
+        </p:style>
+      </p:cxnSp>
+      <p:cxnSp>
+        <p:nvCxnSpPr>
+          <p:cNvPr id="93" name="Conector reto 92"/>
+          <p:cNvCxnSpPr/>
+          <p:nvPr/>
+        </p:nvCxnSpPr>
+        <p:spPr>
+          <a:xfrm rot="16200000">
+            <a:off x="1963349" y="2888032"/>
+            <a:ext cx="0" cy="828000"/>
+          </a:xfrm>
+          <a:prstGeom prst="line">
+            <a:avLst/>
+          </a:prstGeom>
+          <a:ln w="38100">
+            <a:solidFill>
+              <a:schemeClr val="tx1"/>
+            </a:solidFill>
+          </a:ln>
+        </p:spPr>
+        <p:style>
+          <a:lnRef idx="1">
+            <a:schemeClr val="accent1"/>
+          </a:lnRef>
+          <a:fillRef idx="0">
+            <a:schemeClr val="accent1"/>
+          </a:fillRef>
+          <a:effectRef idx="0">
+            <a:schemeClr val="accent1"/>
+          </a:effectRef>
+          <a:fontRef idx="minor">
+            <a:schemeClr val="tx1"/>
+          </a:fontRef>
+        </p:style>
+      </p:cxnSp>
+      <p:cxnSp>
+        <p:nvCxnSpPr>
+          <p:cNvPr id="94" name="Conector reto 93"/>
+          <p:cNvCxnSpPr/>
+          <p:nvPr/>
+        </p:nvCxnSpPr>
+        <p:spPr>
+          <a:xfrm>
+            <a:off x="3491341" y="2186621"/>
+            <a:ext cx="0" cy="378000"/>
+          </a:xfrm>
+          <a:prstGeom prst="line">
+            <a:avLst/>
+          </a:prstGeom>
+          <a:ln w="38100">
+            <a:solidFill>
+              <a:schemeClr val="tx1"/>
+            </a:solidFill>
+          </a:ln>
+        </p:spPr>
+        <p:style>
+          <a:lnRef idx="1">
+            <a:schemeClr val="accent1"/>
+          </a:lnRef>
+          <a:fillRef idx="0">
+            <a:schemeClr val="accent1"/>
+          </a:fillRef>
+          <a:effectRef idx="0">
+            <a:schemeClr val="accent1"/>
+          </a:effectRef>
+          <a:fontRef idx="minor">
+            <a:schemeClr val="tx1"/>
+          </a:fontRef>
+        </p:style>
+      </p:cxnSp>
+      <p:cxnSp>
+        <p:nvCxnSpPr>
+          <p:cNvPr id="95" name="Conector reto 94"/>
+          <p:cNvCxnSpPr/>
+          <p:nvPr/>
+        </p:nvCxnSpPr>
+        <p:spPr>
+          <a:xfrm rot="16200000">
+            <a:off x="3091094" y="1766596"/>
+            <a:ext cx="0" cy="828000"/>
+          </a:xfrm>
+          <a:prstGeom prst="line">
+            <a:avLst/>
+          </a:prstGeom>
+          <a:ln w="38100">
+            <a:solidFill>
+              <a:schemeClr val="tx1"/>
+            </a:solidFill>
+          </a:ln>
+        </p:spPr>
+        <p:style>
+          <a:lnRef idx="1">
+            <a:schemeClr val="accent1"/>
+          </a:lnRef>
+          <a:fillRef idx="0">
+            <a:schemeClr val="accent1"/>
+          </a:fillRef>
+          <a:effectRef idx="0">
+            <a:schemeClr val="accent1"/>
+          </a:effectRef>
+          <a:fontRef idx="minor">
+            <a:schemeClr val="tx1"/>
+          </a:fontRef>
+        </p:style>
+      </p:cxnSp>
+      <p:cxnSp>
+        <p:nvCxnSpPr>
+          <p:cNvPr id="96" name="Conector reto 95"/>
+          <p:cNvCxnSpPr/>
+          <p:nvPr/>
+        </p:nvCxnSpPr>
+        <p:spPr>
+          <a:xfrm>
+            <a:off x="2790311" y="2887651"/>
+            <a:ext cx="0" cy="378000"/>
+          </a:xfrm>
+          <a:prstGeom prst="line">
+            <a:avLst/>
+          </a:prstGeom>
+          <a:ln w="38100">
+            <a:solidFill>
+              <a:schemeClr val="tx1"/>
+            </a:solidFill>
+          </a:ln>
+        </p:spPr>
+        <p:style>
+          <a:lnRef idx="1">
+            <a:schemeClr val="accent1"/>
+          </a:lnRef>
+          <a:fillRef idx="0">
+            <a:schemeClr val="accent1"/>
+          </a:fillRef>
+          <a:effectRef idx="0">
+            <a:schemeClr val="accent1"/>
+          </a:effectRef>
+          <a:fontRef idx="minor">
+            <a:schemeClr val="tx1"/>
+          </a:fontRef>
+        </p:style>
+      </p:cxnSp>
+      <p:cxnSp>
+        <p:nvCxnSpPr>
+          <p:cNvPr id="97" name="Conector reto 96"/>
+          <p:cNvCxnSpPr/>
+          <p:nvPr/>
+        </p:nvCxnSpPr>
+        <p:spPr>
+          <a:xfrm rot="16200000">
+            <a:off x="2390064" y="2467626"/>
+            <a:ext cx="0" cy="828000"/>
+          </a:xfrm>
+          <a:prstGeom prst="line">
+            <a:avLst/>
+          </a:prstGeom>
+          <a:ln w="38100">
+            <a:solidFill>
+              <a:schemeClr val="tx1"/>
+            </a:solidFill>
+          </a:ln>
+        </p:spPr>
+        <p:style>
+          <a:lnRef idx="1">
+            <a:schemeClr val="accent1"/>
+          </a:lnRef>
+          <a:fillRef idx="0">
+            <a:schemeClr val="accent1"/>
+          </a:fillRef>
+          <a:effectRef idx="0">
+            <a:schemeClr val="accent1"/>
+          </a:effectRef>
+          <a:fontRef idx="minor">
+            <a:schemeClr val="tx1"/>
+          </a:fontRef>
+        </p:style>
+      </p:cxnSp>
     </p:spTree>
     <p:extLst>
       <p:ext uri="{BB962C8B-B14F-4D97-AF65-F5344CB8AC3E}">

</xml_diff>